<commit_message>
Update lesson materials with formatting and content revisions
</commit_message>
<xml_diff>
--- a/aga_24_a2_na_0401_lps.pptx
+++ b/aga_24_a2_na_0401_lps.pptx
@@ -5,7 +5,7 @@
     <p:sldMasterId id="2147483648" r:id="rId1"/>
   </p:sldMasterIdLst>
   <p:notesMasterIdLst>
-    <p:notesMasterId r:id="rId22"/>
+    <p:notesMasterId r:id="rId19"/>
   </p:notesMasterIdLst>
   <p:sldIdLst>
     <p:sldId id="256" r:id="rId2"/>
@@ -13,33 +13,21 @@
     <p:sldId id="263" r:id="rId4"/>
     <p:sldId id="361" r:id="rId5"/>
     <p:sldId id="293" r:id="rId6"/>
-    <p:sldId id="362" r:id="rId7"/>
-    <p:sldId id="332" r:id="rId8"/>
-    <p:sldId id="334" r:id="rId9"/>
-    <p:sldId id="346" r:id="rId10"/>
-    <p:sldId id="363" r:id="rId11"/>
-    <p:sldId id="349" r:id="rId12"/>
-    <p:sldId id="355" r:id="rId13"/>
-    <p:sldId id="367" r:id="rId14"/>
-    <p:sldId id="357" r:id="rId15"/>
-    <p:sldId id="358" r:id="rId16"/>
-    <p:sldId id="368" r:id="rId17"/>
-    <p:sldId id="360" r:id="rId18"/>
-    <p:sldId id="283" r:id="rId19"/>
-    <p:sldId id="273" r:id="rId20"/>
-    <p:sldId id="274" r:id="rId21"/>
+    <p:sldId id="332" r:id="rId7"/>
+    <p:sldId id="334" r:id="rId8"/>
+    <p:sldId id="346" r:id="rId9"/>
+    <p:sldId id="363" r:id="rId10"/>
+    <p:sldId id="349" r:id="rId11"/>
+    <p:sldId id="355" r:id="rId12"/>
+    <p:sldId id="367" r:id="rId13"/>
+    <p:sldId id="357" r:id="rId14"/>
+    <p:sldId id="358" r:id="rId15"/>
+    <p:sldId id="368" r:id="rId16"/>
+    <p:sldId id="360" r:id="rId17"/>
+    <p:sldId id="283" r:id="rId18"/>
   </p:sldIdLst>
   <p:sldSz cx="9144000" cy="6858000" type="screen4x3"/>
   <p:notesSz cx="6858000" cy="9144000"/>
-  <p:embeddedFontLst>
-    <p:embeddedFont>
-      <p:font typeface="Calibri" panose="020F0502020204030204" pitchFamily="34" charset="0"/>
-      <p:regular r:id="rId23"/>
-      <p:bold r:id="rId24"/>
-      <p:italic r:id="rId25"/>
-      <p:boldItalic r:id="rId26"/>
-    </p:embeddedFont>
-  </p:embeddedFontLst>
   <p:defaultTextStyle>
     <a:defPPr marR="0" lvl="0" algn="l" rtl="0">
       <a:lnSpc>
@@ -285,10 +273,45 @@
       </p15:sldGuideLst>
     </p:ext>
     <p:ext uri="http://customooxmlschemas.google.com/">
-      <go:slidesCustomData xmlns:go="http://customooxmlschemas.google.com/" xmlns:ahyp="http://schemas.microsoft.com/office/drawing/2018/hyperlinkcolor" xmlns:p15="http://schemas.microsoft.com/office/powerpoint/2012/main" xmlns:p14="http://schemas.microsoft.com/office/powerpoint/2010/main" xmlns:com="http://schemas.openxmlformats.org/drawingml/2006/compatibility" xmlns:pvml="urn:schemas-microsoft-com:office:powerpoint" xmlns:v="urn:schemas-microsoft-com:vml" xmlns:o="urn:schemas-microsoft-com:office:office" xmlns:dgm="http://schemas.openxmlformats.org/drawingml/2006/diagram" xmlns:c="http://schemas.openxmlformats.org/drawingml/2006/chart" xmlns:mv="urn:schemas-microsoft-com:mac:vml" xmlns:mc="http://schemas.openxmlformats.org/markup-compatibility/2006" xmlns="" r:id="rId29" roundtripDataSignature="AMtx7mhuBirG7ZPSvPNLrAnDSwPhBAMDZQ=="/>
+      <go:slidesCustomData xmlns="" xmlns:mc="http://schemas.openxmlformats.org/markup-compatibility/2006" xmlns:mv="urn:schemas-microsoft-com:mac:vml" xmlns:c="http://schemas.openxmlformats.org/drawingml/2006/chart" xmlns:dgm="http://schemas.openxmlformats.org/drawingml/2006/diagram" xmlns:o="urn:schemas-microsoft-com:office:office" xmlns:v="urn:schemas-microsoft-com:vml" xmlns:pvml="urn:schemas-microsoft-com:office:powerpoint" xmlns:com="http://schemas.openxmlformats.org/drawingml/2006/compatibility" xmlns:p14="http://schemas.microsoft.com/office/powerpoint/2010/main" xmlns:p15="http://schemas.microsoft.com/office/powerpoint/2012/main" xmlns:ahyp="http://schemas.microsoft.com/office/drawing/2018/hyperlinkcolor" xmlns:go="http://customooxmlschemas.google.com/" r:id="rId29" roundtripDataSignature="AMtx7mhuBirG7ZPSvPNLrAnDSwPhBAMDZQ=="/>
     </p:ext>
   </p:extLst>
 </p:presentation>
+</file>
+
+<file path=ppt/changesInfos/changesInfo1.xml><?xml version="1.0" encoding="utf-8"?>
+<pc:chgInfo xmlns:a="http://schemas.openxmlformats.org/drawingml/2006/main" xmlns:r="http://schemas.openxmlformats.org/officeDocument/2006/relationships" xmlns:ac="http://schemas.microsoft.com/office/drawing/2013/main/command" xmlns:pc="http://schemas.microsoft.com/office/powerpoint/2013/main/command">
+  <pc:docChgLst>
+    <pc:chgData name="Colson, Robert" userId="25586c2a-52f0-4ea1-8d29-b1cb0db384a0" providerId="ADAL" clId="{A3A4A539-9312-495B-BFB6-C3D9437C8ECF}"/>
+    <pc:docChg chg="delSld">
+      <pc:chgData name="Colson, Robert" userId="25586c2a-52f0-4ea1-8d29-b1cb0db384a0" providerId="ADAL" clId="{A3A4A539-9312-495B-BFB6-C3D9437C8ECF}" dt="2025-02-14T14:27:27.399" v="2" actId="47"/>
+      <pc:docMkLst>
+        <pc:docMk/>
+      </pc:docMkLst>
+      <pc:sldChg chg="del">
+        <pc:chgData name="Colson, Robert" userId="25586c2a-52f0-4ea1-8d29-b1cb0db384a0" providerId="ADAL" clId="{A3A4A539-9312-495B-BFB6-C3D9437C8ECF}" dt="2025-02-14T14:27:27.399" v="2" actId="47"/>
+        <pc:sldMkLst>
+          <pc:docMk/>
+          <pc:sldMk cId="1087053607" sldId="273"/>
+        </pc:sldMkLst>
+      </pc:sldChg>
+      <pc:sldChg chg="del">
+        <pc:chgData name="Colson, Robert" userId="25586c2a-52f0-4ea1-8d29-b1cb0db384a0" providerId="ADAL" clId="{A3A4A539-9312-495B-BFB6-C3D9437C8ECF}" dt="2025-02-14T14:27:25.750" v="1" actId="47"/>
+        <pc:sldMkLst>
+          <pc:docMk/>
+          <pc:sldMk cId="1389967839" sldId="274"/>
+        </pc:sldMkLst>
+      </pc:sldChg>
+      <pc:sldChg chg="del">
+        <pc:chgData name="Colson, Robert" userId="25586c2a-52f0-4ea1-8d29-b1cb0db384a0" providerId="ADAL" clId="{A3A4A539-9312-495B-BFB6-C3D9437C8ECF}" dt="2025-02-14T13:42:41.179" v="0" actId="47"/>
+        <pc:sldMkLst>
+          <pc:docMk/>
+          <pc:sldMk cId="1062313780" sldId="362"/>
+        </pc:sldMkLst>
+      </pc:sldChg>
+    </pc:docChg>
+  </pc:docChgLst>
+</pc:chgInfo>
 </file>
 
 <file path=ppt/notesMasters/notesMaster1.xml><?xml version="1.0" encoding="utf-8"?>
@@ -2266,7 +2289,7 @@
     </p:spTree>
     <p:extLst>
       <p:ext uri="{BB962C8B-B14F-4D97-AF65-F5344CB8AC3E}">
-        <p14:creationId xmlns:p14="http://schemas.microsoft.com/office/powerpoint/2010/main" val="2522344940"/>
+        <p14:creationId xmlns:p14="http://schemas.microsoft.com/office/powerpoint/2010/main" val="1509881048"/>
       </p:ext>
     </p:extLst>
   </p:cSld>
@@ -2383,7 +2406,7 @@
     </p:spTree>
     <p:extLst>
       <p:ext uri="{BB962C8B-B14F-4D97-AF65-F5344CB8AC3E}">
-        <p14:creationId xmlns:p14="http://schemas.microsoft.com/office/powerpoint/2010/main" val="1509881048"/>
+        <p14:creationId xmlns:p14="http://schemas.microsoft.com/office/powerpoint/2010/main" val="2522344940"/>
       </p:ext>
     </p:extLst>
   </p:cSld>
@@ -2437,7 +2460,7 @@
           <a:bodyPr/>
           <a:lstStyle/>
           <a:p>
-            <a:endParaRPr lang="en-US"/>
+            <a:endParaRPr lang="en-US" dirty="0"/>
           </a:p>
         </p:txBody>
       </p:sp>
@@ -2554,7 +2577,7 @@
           <a:bodyPr/>
           <a:lstStyle/>
           <a:p>
-            <a:endParaRPr lang="en-US" dirty="0"/>
+            <a:endParaRPr lang="en-US"/>
           </a:p>
         </p:txBody>
       </p:sp>
@@ -2617,7 +2640,7 @@
     </p:spTree>
     <p:extLst>
       <p:ext uri="{BB962C8B-B14F-4D97-AF65-F5344CB8AC3E}">
-        <p14:creationId xmlns:p14="http://schemas.microsoft.com/office/powerpoint/2010/main" val="2522344940"/>
+        <p14:creationId xmlns:p14="http://schemas.microsoft.com/office/powerpoint/2010/main" val="1870212098"/>
       </p:ext>
     </p:extLst>
   </p:cSld>
@@ -2734,7 +2757,7 @@
     </p:spTree>
     <p:extLst>
       <p:ext uri="{BB962C8B-B14F-4D97-AF65-F5344CB8AC3E}">
-        <p14:creationId xmlns:p14="http://schemas.microsoft.com/office/powerpoint/2010/main" val="1870212098"/>
+        <p14:creationId xmlns:p14="http://schemas.microsoft.com/office/powerpoint/2010/main" val="2522344940"/>
       </p:ext>
     </p:extLst>
   </p:cSld>
@@ -2745,123 +2768,6 @@
 </file>
 
 <file path=ppt/notesSlides/notesSlide17.xml><?xml version="1.0" encoding="utf-8"?>
-<p:notes xmlns:a="http://schemas.openxmlformats.org/drawingml/2006/main" xmlns:r="http://schemas.openxmlformats.org/officeDocument/2006/relationships" xmlns:p="http://schemas.openxmlformats.org/presentationml/2006/main">
-  <p:cSld>
-    <p:spTree>
-      <p:nvGrpSpPr>
-        <p:cNvPr id="1" name=""/>
-        <p:cNvGrpSpPr/>
-        <p:nvPr/>
-      </p:nvGrpSpPr>
-      <p:grpSpPr>
-        <a:xfrm>
-          <a:off x="0" y="0"/>
-          <a:ext cx="0" cy="0"/>
-          <a:chOff x="0" y="0"/>
-          <a:chExt cx="0" cy="0"/>
-        </a:xfrm>
-      </p:grpSpPr>
-      <p:sp>
-        <p:nvSpPr>
-          <p:cNvPr id="2" name="Slide Image Placeholder 1"/>
-          <p:cNvSpPr>
-            <a:spLocks noGrp="1" noRot="1" noChangeAspect="1"/>
-          </p:cNvSpPr>
-          <p:nvPr>
-            <p:ph type="sldImg"/>
-          </p:nvPr>
-        </p:nvSpPr>
-        <p:spPr/>
-      </p:sp>
-      <p:sp>
-        <p:nvSpPr>
-          <p:cNvPr id="3" name="Notes Placeholder 2"/>
-          <p:cNvSpPr>
-            <a:spLocks noGrp="1"/>
-          </p:cNvSpPr>
-          <p:nvPr>
-            <p:ph type="body" idx="1"/>
-          </p:nvPr>
-        </p:nvSpPr>
-        <p:spPr/>
-        <p:txBody>
-          <a:bodyPr/>
-          <a:lstStyle/>
-          <a:p>
-            <a:endParaRPr lang="en-US"/>
-          </a:p>
-        </p:txBody>
-      </p:sp>
-      <p:sp>
-        <p:nvSpPr>
-          <p:cNvPr id="4" name="Slide Number Placeholder 3"/>
-          <p:cNvSpPr>
-            <a:spLocks noGrp="1"/>
-          </p:cNvSpPr>
-          <p:nvPr>
-            <p:ph type="sldNum" idx="12"/>
-          </p:nvPr>
-        </p:nvSpPr>
-        <p:spPr/>
-        <p:txBody>
-          <a:bodyPr/>
-          <a:lstStyle/>
-          <a:p>
-            <a:pPr marL="0" marR="0" lvl="0" indent="0" algn="r" rtl="0">
-              <a:lnSpc>
-                <a:spcPct val="100000"/>
-              </a:lnSpc>
-              <a:spcBef>
-                <a:spcPts val="0"/>
-              </a:spcBef>
-              <a:spcAft>
-                <a:spcPts val="0"/>
-              </a:spcAft>
-              <a:buClr>
-                <a:srgbClr val="000000"/>
-              </a:buClr>
-              <a:buSzPts val="1200"/>
-              <a:buFont typeface="Arial"/>
-              <a:buNone/>
-            </a:pPr>
-            <a:fld id="{00000000-1234-1234-1234-123412341234}" type="slidenum">
-              <a:rPr lang="en-US" sz="1200" b="0" i="0" u="none" strike="noStrike" cap="none" smtClean="0">
-                <a:solidFill>
-                  <a:schemeClr val="dk1"/>
-                </a:solidFill>
-                <a:latin typeface="Calibri"/>
-                <a:ea typeface="Calibri"/>
-                <a:cs typeface="Calibri"/>
-                <a:sym typeface="Calibri"/>
-              </a:rPr>
-              <a:t>17</a:t>
-            </a:fld>
-            <a:endParaRPr lang="en-US" sz="1200" b="0" i="0" u="none" strike="noStrike" cap="none">
-              <a:solidFill>
-                <a:schemeClr val="dk1"/>
-              </a:solidFill>
-              <a:latin typeface="Calibri"/>
-              <a:ea typeface="Calibri"/>
-              <a:cs typeface="Calibri"/>
-              <a:sym typeface="Calibri"/>
-            </a:endParaRPr>
-          </a:p>
-        </p:txBody>
-      </p:sp>
-    </p:spTree>
-    <p:extLst>
-      <p:ext uri="{BB962C8B-B14F-4D97-AF65-F5344CB8AC3E}">
-        <p14:creationId xmlns:p14="http://schemas.microsoft.com/office/powerpoint/2010/main" val="2522344940"/>
-      </p:ext>
-    </p:extLst>
-  </p:cSld>
-  <p:clrMapOvr>
-    <a:masterClrMapping/>
-  </p:clrMapOvr>
-</p:notes>
-</file>
-
-<file path=ppt/notesSlides/notesSlide18.xml><?xml version="1.0" encoding="utf-8"?>
 <p:notes xmlns:a="http://schemas.openxmlformats.org/drawingml/2006/main" xmlns:r="http://schemas.openxmlformats.org/officeDocument/2006/relationships" xmlns:p="http://schemas.openxmlformats.org/presentationml/2006/main" showMasterSp="0" showMasterPhAnim="0">
   <p:cSld>
     <p:spTree>
@@ -3019,7 +2925,7 @@
             </a:pPr>
             <a:fld id="{00000000-1234-1234-1234-123412341234}" type="slidenum">
               <a:rPr lang="en-US"/>
-              <a:t>18</a:t>
+              <a:t>17</a:t>
             </a:fld>
             <a:endParaRPr/>
           </a:p>
@@ -3029,183 +2935,6 @@
     <p:extLst>
       <p:ext uri="{BB962C8B-B14F-4D97-AF65-F5344CB8AC3E}">
         <p14:creationId xmlns:p14="http://schemas.microsoft.com/office/powerpoint/2010/main" val="1020331078"/>
-      </p:ext>
-    </p:extLst>
-  </p:cSld>
-  <p:clrMapOvr>
-    <a:masterClrMapping/>
-  </p:clrMapOvr>
-</p:notes>
-</file>
-
-<file path=ppt/notesSlides/notesSlide19.xml><?xml version="1.0" encoding="utf-8"?>
-<p:notes xmlns:a="http://schemas.openxmlformats.org/drawingml/2006/main" xmlns:r="http://schemas.openxmlformats.org/officeDocument/2006/relationships" xmlns:p="http://schemas.openxmlformats.org/presentationml/2006/main" showMasterSp="0" showMasterPhAnim="0">
-  <p:cSld>
-    <p:spTree>
-      <p:nvGrpSpPr>
-        <p:cNvPr id="1" name="Shape 169"/>
-        <p:cNvGrpSpPr/>
-        <p:nvPr/>
-      </p:nvGrpSpPr>
-      <p:grpSpPr>
-        <a:xfrm>
-          <a:off x="0" y="0"/>
-          <a:ext cx="0" cy="0"/>
-          <a:chOff x="0" y="0"/>
-          <a:chExt cx="0" cy="0"/>
-        </a:xfrm>
-      </p:grpSpPr>
-      <p:sp>
-        <p:nvSpPr>
-          <p:cNvPr id="170" name="Google Shape;170;g10ebb404171_0_179:notes"/>
-          <p:cNvSpPr>
-            <a:spLocks noGrp="1" noRot="1" noChangeAspect="1"/>
-          </p:cNvSpPr>
-          <p:nvPr>
-            <p:ph type="sldImg" idx="2"/>
-          </p:nvPr>
-        </p:nvSpPr>
-        <p:spPr>
-          <a:xfrm>
-            <a:off x="1371600" y="1143000"/>
-            <a:ext cx="4114800" cy="3086100"/>
-          </a:xfrm>
-          <a:custGeom>
-            <a:avLst/>
-            <a:gdLst/>
-            <a:ahLst/>
-            <a:cxnLst/>
-            <a:rect l="l" t="t" r="r" b="b"/>
-            <a:pathLst>
-              <a:path w="120000" h="120000" extrusionOk="0">
-                <a:moveTo>
-                  <a:pt x="0" y="0"/>
-                </a:moveTo>
-                <a:lnTo>
-                  <a:pt x="120000" y="0"/>
-                </a:lnTo>
-                <a:lnTo>
-                  <a:pt x="120000" y="120000"/>
-                </a:lnTo>
-                <a:lnTo>
-                  <a:pt x="0" y="120000"/>
-                </a:lnTo>
-                <a:close/>
-              </a:path>
-            </a:pathLst>
-          </a:custGeom>
-          <a:noFill/>
-          <a:ln w="12700" cap="flat" cmpd="sng">
-            <a:solidFill>
-              <a:srgbClr val="000000"/>
-            </a:solidFill>
-            <a:prstDash val="solid"/>
-            <a:round/>
-            <a:headEnd type="none" w="sm" len="sm"/>
-            <a:tailEnd type="none" w="sm" len="sm"/>
-          </a:ln>
-        </p:spPr>
-      </p:sp>
-      <p:sp>
-        <p:nvSpPr>
-          <p:cNvPr id="171" name="Google Shape;171;g10ebb404171_0_179:notes"/>
-          <p:cNvSpPr txBox="1">
-            <a:spLocks noGrp="1"/>
-          </p:cNvSpPr>
-          <p:nvPr>
-            <p:ph type="body" idx="1"/>
-          </p:nvPr>
-        </p:nvSpPr>
-        <p:spPr>
-          <a:xfrm>
-            <a:off x="685800" y="4400550"/>
-            <a:ext cx="5486400" cy="3600600"/>
-          </a:xfrm>
-          <a:prstGeom prst="rect">
-            <a:avLst/>
-          </a:prstGeom>
-          <a:noFill/>
-          <a:ln>
-            <a:noFill/>
-          </a:ln>
-        </p:spPr>
-        <p:txBody>
-          <a:bodyPr spcFirstLastPara="1" wrap="square" lIns="91425" tIns="45700" rIns="91425" bIns="45700" anchor="t" anchorCtr="0">
-            <a:noAutofit/>
-          </a:bodyPr>
-          <a:lstStyle/>
-          <a:p>
-            <a:pPr marL="0" lvl="0" indent="0" algn="l" rtl="0">
-              <a:lnSpc>
-                <a:spcPct val="100000"/>
-              </a:lnSpc>
-              <a:spcBef>
-                <a:spcPts val="0"/>
-              </a:spcBef>
-              <a:spcAft>
-                <a:spcPts val="0"/>
-              </a:spcAft>
-              <a:buSzPts val="1400"/>
-              <a:buNone/>
-            </a:pPr>
-            <a:endParaRPr/>
-          </a:p>
-        </p:txBody>
-      </p:sp>
-      <p:sp>
-        <p:nvSpPr>
-          <p:cNvPr id="172" name="Google Shape;172;g10ebb404171_0_179:notes"/>
-          <p:cNvSpPr txBox="1">
-            <a:spLocks noGrp="1"/>
-          </p:cNvSpPr>
-          <p:nvPr>
-            <p:ph type="sldNum" idx="12"/>
-          </p:nvPr>
-        </p:nvSpPr>
-        <p:spPr>
-          <a:xfrm>
-            <a:off x="3884613" y="8685213"/>
-            <a:ext cx="2971800" cy="458700"/>
-          </a:xfrm>
-          <a:prstGeom prst="rect">
-            <a:avLst/>
-          </a:prstGeom>
-          <a:noFill/>
-          <a:ln>
-            <a:noFill/>
-          </a:ln>
-        </p:spPr>
-        <p:txBody>
-          <a:bodyPr spcFirstLastPara="1" wrap="square" lIns="91425" tIns="45700" rIns="91425" bIns="45700" anchor="b" anchorCtr="0">
-            <a:noAutofit/>
-          </a:bodyPr>
-          <a:lstStyle/>
-          <a:p>
-            <a:pPr marL="0" lvl="0" indent="0" algn="r" rtl="0">
-              <a:lnSpc>
-                <a:spcPct val="100000"/>
-              </a:lnSpc>
-              <a:spcBef>
-                <a:spcPts val="0"/>
-              </a:spcBef>
-              <a:spcAft>
-                <a:spcPts val="0"/>
-              </a:spcAft>
-              <a:buSzPts val="1400"/>
-              <a:buNone/>
-            </a:pPr>
-            <a:fld id="{00000000-1234-1234-1234-123412341234}" type="slidenum">
-              <a:rPr lang="en-US"/>
-              <a:t>19</a:t>
-            </a:fld>
-            <a:endParaRPr/>
-          </a:p>
-        </p:txBody>
-      </p:sp>
-    </p:spTree>
-    <p:extLst>
-      <p:ext uri="{BB962C8B-B14F-4D97-AF65-F5344CB8AC3E}">
-        <p14:creationId xmlns:p14="http://schemas.microsoft.com/office/powerpoint/2010/main" val="2172565838"/>
       </p:ext>
     </p:extLst>
   </p:cSld>
@@ -3383,183 +3112,6 @@
     <p:extLst>
       <p:ext uri="{BB962C8B-B14F-4D97-AF65-F5344CB8AC3E}">
         <p14:creationId xmlns:p14="http://schemas.microsoft.com/office/powerpoint/2010/main" val="725595472"/>
-      </p:ext>
-    </p:extLst>
-  </p:cSld>
-  <p:clrMapOvr>
-    <a:masterClrMapping/>
-  </p:clrMapOvr>
-</p:notes>
-</file>
-
-<file path=ppt/notesSlides/notesSlide20.xml><?xml version="1.0" encoding="utf-8"?>
-<p:notes xmlns:a="http://schemas.openxmlformats.org/drawingml/2006/main" xmlns:r="http://schemas.openxmlformats.org/officeDocument/2006/relationships" xmlns:p="http://schemas.openxmlformats.org/presentationml/2006/main" showMasterSp="0" showMasterPhAnim="0">
-  <p:cSld>
-    <p:spTree>
-      <p:nvGrpSpPr>
-        <p:cNvPr id="1" name="Shape 169"/>
-        <p:cNvGrpSpPr/>
-        <p:nvPr/>
-      </p:nvGrpSpPr>
-      <p:grpSpPr>
-        <a:xfrm>
-          <a:off x="0" y="0"/>
-          <a:ext cx="0" cy="0"/>
-          <a:chOff x="0" y="0"/>
-          <a:chExt cx="0" cy="0"/>
-        </a:xfrm>
-      </p:grpSpPr>
-      <p:sp>
-        <p:nvSpPr>
-          <p:cNvPr id="170" name="Google Shape;170;g10ebb404171_0_179:notes"/>
-          <p:cNvSpPr>
-            <a:spLocks noGrp="1" noRot="1" noChangeAspect="1"/>
-          </p:cNvSpPr>
-          <p:nvPr>
-            <p:ph type="sldImg" idx="2"/>
-          </p:nvPr>
-        </p:nvSpPr>
-        <p:spPr>
-          <a:xfrm>
-            <a:off x="1371600" y="1143000"/>
-            <a:ext cx="4114800" cy="3086100"/>
-          </a:xfrm>
-          <a:custGeom>
-            <a:avLst/>
-            <a:gdLst/>
-            <a:ahLst/>
-            <a:cxnLst/>
-            <a:rect l="l" t="t" r="r" b="b"/>
-            <a:pathLst>
-              <a:path w="120000" h="120000" extrusionOk="0">
-                <a:moveTo>
-                  <a:pt x="0" y="0"/>
-                </a:moveTo>
-                <a:lnTo>
-                  <a:pt x="120000" y="0"/>
-                </a:lnTo>
-                <a:lnTo>
-                  <a:pt x="120000" y="120000"/>
-                </a:lnTo>
-                <a:lnTo>
-                  <a:pt x="0" y="120000"/>
-                </a:lnTo>
-                <a:close/>
-              </a:path>
-            </a:pathLst>
-          </a:custGeom>
-          <a:noFill/>
-          <a:ln w="12700" cap="flat" cmpd="sng">
-            <a:solidFill>
-              <a:srgbClr val="000000"/>
-            </a:solidFill>
-            <a:prstDash val="solid"/>
-            <a:round/>
-            <a:headEnd type="none" w="sm" len="sm"/>
-            <a:tailEnd type="none" w="sm" len="sm"/>
-          </a:ln>
-        </p:spPr>
-      </p:sp>
-      <p:sp>
-        <p:nvSpPr>
-          <p:cNvPr id="171" name="Google Shape;171;g10ebb404171_0_179:notes"/>
-          <p:cNvSpPr txBox="1">
-            <a:spLocks noGrp="1"/>
-          </p:cNvSpPr>
-          <p:nvPr>
-            <p:ph type="body" idx="1"/>
-          </p:nvPr>
-        </p:nvSpPr>
-        <p:spPr>
-          <a:xfrm>
-            <a:off x="685800" y="4400550"/>
-            <a:ext cx="5486400" cy="3600600"/>
-          </a:xfrm>
-          <a:prstGeom prst="rect">
-            <a:avLst/>
-          </a:prstGeom>
-          <a:noFill/>
-          <a:ln>
-            <a:noFill/>
-          </a:ln>
-        </p:spPr>
-        <p:txBody>
-          <a:bodyPr spcFirstLastPara="1" wrap="square" lIns="91425" tIns="45700" rIns="91425" bIns="45700" anchor="t" anchorCtr="0">
-            <a:noAutofit/>
-          </a:bodyPr>
-          <a:lstStyle/>
-          <a:p>
-            <a:pPr marL="0" lvl="0" indent="0" algn="l" rtl="0">
-              <a:lnSpc>
-                <a:spcPct val="100000"/>
-              </a:lnSpc>
-              <a:spcBef>
-                <a:spcPts val="0"/>
-              </a:spcBef>
-              <a:spcAft>
-                <a:spcPts val="0"/>
-              </a:spcAft>
-              <a:buSzPts val="1400"/>
-              <a:buNone/>
-            </a:pPr>
-            <a:endParaRPr dirty="0"/>
-          </a:p>
-        </p:txBody>
-      </p:sp>
-      <p:sp>
-        <p:nvSpPr>
-          <p:cNvPr id="172" name="Google Shape;172;g10ebb404171_0_179:notes"/>
-          <p:cNvSpPr txBox="1">
-            <a:spLocks noGrp="1"/>
-          </p:cNvSpPr>
-          <p:nvPr>
-            <p:ph type="sldNum" idx="12"/>
-          </p:nvPr>
-        </p:nvSpPr>
-        <p:spPr>
-          <a:xfrm>
-            <a:off x="3884613" y="8685213"/>
-            <a:ext cx="2971800" cy="458700"/>
-          </a:xfrm>
-          <a:prstGeom prst="rect">
-            <a:avLst/>
-          </a:prstGeom>
-          <a:noFill/>
-          <a:ln>
-            <a:noFill/>
-          </a:ln>
-        </p:spPr>
-        <p:txBody>
-          <a:bodyPr spcFirstLastPara="1" wrap="square" lIns="91425" tIns="45700" rIns="91425" bIns="45700" anchor="b" anchorCtr="0">
-            <a:noAutofit/>
-          </a:bodyPr>
-          <a:lstStyle/>
-          <a:p>
-            <a:pPr marL="0" lvl="0" indent="0" algn="r" rtl="0">
-              <a:lnSpc>
-                <a:spcPct val="100000"/>
-              </a:lnSpc>
-              <a:spcBef>
-                <a:spcPts val="0"/>
-              </a:spcBef>
-              <a:spcAft>
-                <a:spcPts val="0"/>
-              </a:spcAft>
-              <a:buSzPts val="1400"/>
-              <a:buNone/>
-            </a:pPr>
-            <a:fld id="{00000000-1234-1234-1234-123412341234}" type="slidenum">
-              <a:rPr lang="en-US"/>
-              <a:t>20</a:t>
-            </a:fld>
-            <a:endParaRPr/>
-          </a:p>
-        </p:txBody>
-      </p:sp>
-    </p:spTree>
-    <p:extLst>
-      <p:ext uri="{BB962C8B-B14F-4D97-AF65-F5344CB8AC3E}">
-        <p14:creationId xmlns:p14="http://schemas.microsoft.com/office/powerpoint/2010/main" val="3390440778"/>
       </p:ext>
     </p:extLst>
   </p:cSld>
@@ -4084,7 +3636,7 @@
           <a:bodyPr/>
           <a:lstStyle/>
           <a:p>
-            <a:endParaRPr lang="en-US"/>
+            <a:endParaRPr lang="en-US" dirty="0"/>
           </a:p>
         </p:txBody>
       </p:sp>
@@ -4201,7 +3753,7 @@
           <a:bodyPr/>
           <a:lstStyle/>
           <a:p>
-            <a:endParaRPr lang="en-US" dirty="0"/>
+            <a:endParaRPr lang="en-US"/>
           </a:p>
         </p:txBody>
       </p:sp>
@@ -5993,484 +5545,6 @@
       </p:grpSpPr>
       <p:sp>
         <p:nvSpPr>
-          <p:cNvPr id="5" name="TextBox 4">
-            <a:extLst>
-              <a:ext uri="{FF2B5EF4-FFF2-40B4-BE49-F238E27FC236}">
-                <a16:creationId xmlns:a16="http://schemas.microsoft.com/office/drawing/2014/main" id="{6E8F0502-F26D-4842-97A7-E6A7B55ABA0B}"/>
-              </a:ext>
-            </a:extLst>
-          </p:cNvPr>
-          <p:cNvSpPr txBox="1"/>
-          <p:nvPr/>
-        </p:nvSpPr>
-        <p:spPr>
-          <a:xfrm>
-            <a:off x="355758" y="706927"/>
-            <a:ext cx="8321209" cy="5504071"/>
-          </a:xfrm>
-          <a:prstGeom prst="rect">
-            <a:avLst/>
-          </a:prstGeom>
-          <a:noFill/>
-        </p:spPr>
-        <p:txBody>
-          <a:bodyPr wrap="square" rIns="36000" rtlCol="0">
-            <a:spAutoFit/>
-          </a:bodyPr>
-          <a:lstStyle/>
-          <a:p>
-            <a:pPr>
-              <a:spcAft>
-                <a:spcPts val="6200"/>
-              </a:spcAft>
-              <a:tabLst>
-                <a:tab pos="1584000" algn="l"/>
-              </a:tabLst>
-            </a:pPr>
-            <a:r>
-              <a:rPr lang="en-IN" sz="1800" b="1" dirty="0">
-                <a:solidFill>
-                  <a:srgbClr val="0078AE"/>
-                </a:solidFill>
-              </a:rPr>
-              <a:t>	</a:t>
-            </a:r>
-            <a:r>
-              <a:rPr lang="de-DE" sz="1800" b="1" dirty="0">
-                <a:solidFill>
-                  <a:srgbClr val="58585A"/>
-                </a:solidFill>
-              </a:rPr>
-              <a:t>Use an Inverse Variation Model</a:t>
-            </a:r>
-            <a:endParaRPr lang="en-US" sz="1800" b="1" dirty="0">
-              <a:solidFill>
-                <a:srgbClr val="58585A"/>
-              </a:solidFill>
-            </a:endParaRPr>
-          </a:p>
-          <a:p>
-            <a:pPr>
-              <a:spcAft>
-                <a:spcPts val="13200"/>
-              </a:spcAft>
-            </a:pPr>
-            <a:r>
-              <a:rPr lang="en-US" b="1" dirty="0"/>
-              <a:t>Step 1</a:t>
-            </a:r>
-            <a:r>
-              <a:rPr lang="en-US" dirty="0"/>
-              <a:t>   Write the equation for an inverse variation and solve for </a:t>
-            </a:r>
-            <a:r>
-              <a:rPr lang="en-US" i="1" dirty="0"/>
-              <a:t>k</a:t>
-            </a:r>
-            <a:r>
-              <a:rPr lang="en-US" dirty="0"/>
-              <a:t>.</a:t>
-            </a:r>
-          </a:p>
-          <a:p>
-            <a:pPr>
-              <a:spcAft>
-                <a:spcPts val="15600"/>
-              </a:spcAft>
-            </a:pPr>
-            <a:r>
-              <a:rPr lang="en-US" b="1" dirty="0"/>
-              <a:t>Step 2</a:t>
-            </a:r>
-            <a:r>
-              <a:rPr lang="en-US" dirty="0"/>
-              <a:t>   Substitute </a:t>
-            </a:r>
-            <a:r>
-              <a:rPr lang="en-US" i="1" dirty="0"/>
-              <a:t>k</a:t>
-            </a:r>
-            <a:r>
-              <a:rPr lang="en-US" dirty="0"/>
-              <a:t> = 8,570.38 in the inverse variation equation and then find </a:t>
-            </a:r>
-            <a:r>
-              <a:rPr lang="en-US" i="1" dirty="0"/>
-              <a:t>f</a:t>
-            </a:r>
-            <a:r>
-              <a:rPr lang="en-US" dirty="0"/>
-              <a:t>.</a:t>
-            </a:r>
-          </a:p>
-          <a:p>
-            <a:r>
-              <a:rPr lang="en-US" dirty="0"/>
-              <a:t>So the frequency of the 13-inch string is 659.26 cycles per second.</a:t>
-            </a:r>
-            <a:endParaRPr lang="en-IN" b="1" dirty="0">
-              <a:solidFill>
-                <a:schemeClr val="tx1"/>
-              </a:solidFill>
-            </a:endParaRPr>
-          </a:p>
-        </p:txBody>
-      </p:sp>
-      <p:sp>
-        <p:nvSpPr>
-          <p:cNvPr id="6" name="Rectangle 5">
-            <a:extLst>
-              <a:ext uri="{FF2B5EF4-FFF2-40B4-BE49-F238E27FC236}">
-                <a16:creationId xmlns:a16="http://schemas.microsoft.com/office/drawing/2014/main" id="{33341DDE-51A7-BB4A-A5D0-B99BDB557C68}"/>
-              </a:ext>
-            </a:extLst>
-          </p:cNvPr>
-          <p:cNvSpPr/>
-          <p:nvPr/>
-        </p:nvSpPr>
-        <p:spPr>
-          <a:xfrm>
-            <a:off x="452746" y="749488"/>
-            <a:ext cx="1480557" cy="295175"/>
-          </a:xfrm>
-          <a:prstGeom prst="rect">
-            <a:avLst/>
-          </a:prstGeom>
-          <a:solidFill>
-            <a:srgbClr val="1A4F8D"/>
-          </a:solidFill>
-          <a:ln>
-            <a:noFill/>
-          </a:ln>
-        </p:spPr>
-        <p:style>
-          <a:lnRef idx="2">
-            <a:schemeClr val="accent1">
-              <a:shade val="50000"/>
-            </a:schemeClr>
-          </a:lnRef>
-          <a:fillRef idx="1">
-            <a:schemeClr val="accent1"/>
-          </a:fillRef>
-          <a:effectRef idx="0">
-            <a:schemeClr val="accent1"/>
-          </a:effectRef>
-          <a:fontRef idx="minor">
-            <a:schemeClr val="lt1"/>
-          </a:fontRef>
-        </p:style>
-        <p:txBody>
-          <a:bodyPr wrap="square" tIns="0" bIns="18000" rtlCol="0" anchor="ctr">
-            <a:spAutoFit/>
-          </a:bodyPr>
-          <a:lstStyle/>
-          <a:p>
-            <a:r>
-              <a:rPr lang="en-IN" sz="1800" b="1" cap="all" dirty="0">
-                <a:solidFill>
-                  <a:schemeClr val="bg1"/>
-                </a:solidFill>
-              </a:rPr>
-              <a:t>Example 3</a:t>
-            </a:r>
-            <a:endParaRPr lang="en-US" sz="1800" cap="all" dirty="0"/>
-          </a:p>
-        </p:txBody>
-      </p:sp>
-      <p:sp>
-        <p:nvSpPr>
-          <p:cNvPr id="8" name="TextBox 7">
-            <a:extLst>
-              <a:ext uri="{FF2B5EF4-FFF2-40B4-BE49-F238E27FC236}">
-                <a16:creationId xmlns:a16="http://schemas.microsoft.com/office/drawing/2014/main" id="{E2AF600D-6F8E-AF4F-9F8A-7A6BE3BFBF7F}"/>
-              </a:ext>
-            </a:extLst>
-          </p:cNvPr>
-          <p:cNvSpPr txBox="1"/>
-          <p:nvPr/>
-        </p:nvSpPr>
-        <p:spPr>
-          <a:xfrm>
-            <a:off x="355758" y="351588"/>
-            <a:ext cx="8341433" cy="369332"/>
-          </a:xfrm>
-          <a:prstGeom prst="rect">
-            <a:avLst/>
-          </a:prstGeom>
-          <a:noFill/>
-        </p:spPr>
-        <p:txBody>
-          <a:bodyPr wrap="square" rIns="36000" rtlCol="0">
-            <a:spAutoFit/>
-          </a:bodyPr>
-          <a:lstStyle/>
-          <a:p>
-            <a:r>
-              <a:rPr lang="en-IN" sz="1800" b="1" dirty="0">
-                <a:solidFill>
-                  <a:srgbClr val="137F97"/>
-                </a:solidFill>
-              </a:rPr>
-              <a:t>APPLICATION</a:t>
-            </a:r>
-            <a:endParaRPr lang="en-IN" sz="1800" dirty="0">
-              <a:solidFill>
-                <a:srgbClr val="137F97"/>
-              </a:solidFill>
-            </a:endParaRPr>
-          </a:p>
-        </p:txBody>
-      </p:sp>
-      <p:pic>
-        <p:nvPicPr>
-          <p:cNvPr id="7" name="Picture 6">
-            <a:extLst>
-              <a:ext uri="{FF2B5EF4-FFF2-40B4-BE49-F238E27FC236}">
-                <a16:creationId xmlns:a16="http://schemas.microsoft.com/office/drawing/2014/main" id="{98FF4F23-30DB-3176-1DAE-3721A1E367CF}"/>
-              </a:ext>
-            </a:extLst>
-          </p:cNvPr>
-          <p:cNvPicPr>
-            <a:picLocks noChangeAspect="1"/>
-          </p:cNvPicPr>
-          <p:nvPr/>
-        </p:nvPicPr>
-        <p:blipFill>
-          <a:blip r:embed="rId3"/>
-          <a:stretch>
-            <a:fillRect/>
-          </a:stretch>
-        </p:blipFill>
-        <p:spPr>
-          <a:xfrm>
-            <a:off x="999733" y="2087587"/>
-            <a:ext cx="3666850" cy="1521941"/>
-          </a:xfrm>
-          <a:prstGeom prst="rect">
-            <a:avLst/>
-          </a:prstGeom>
-        </p:spPr>
-      </p:pic>
-      <p:pic>
-        <p:nvPicPr>
-          <p:cNvPr id="10" name="Picture 9">
-            <a:extLst>
-              <a:ext uri="{FF2B5EF4-FFF2-40B4-BE49-F238E27FC236}">
-                <a16:creationId xmlns:a16="http://schemas.microsoft.com/office/drawing/2014/main" id="{9AE2C2B9-606B-9255-9BBF-A285867D70CB}"/>
-              </a:ext>
-            </a:extLst>
-          </p:cNvPr>
-          <p:cNvPicPr>
-            <a:picLocks noChangeAspect="1"/>
-          </p:cNvPicPr>
-          <p:nvPr/>
-        </p:nvPicPr>
-        <p:blipFill>
-          <a:blip r:embed="rId4"/>
-          <a:stretch>
-            <a:fillRect/>
-          </a:stretch>
-        </p:blipFill>
-        <p:spPr>
-          <a:xfrm>
-            <a:off x="1541322" y="4059583"/>
-            <a:ext cx="1379209" cy="1786900"/>
-          </a:xfrm>
-          <a:prstGeom prst="rect">
-            <a:avLst/>
-          </a:prstGeom>
-        </p:spPr>
-      </p:pic>
-      <p:sp>
-        <p:nvSpPr>
-          <p:cNvPr id="11" name="Rounded Rectangle 10">
-            <a:extLst>
-              <a:ext uri="{FF2B5EF4-FFF2-40B4-BE49-F238E27FC236}">
-                <a16:creationId xmlns:a16="http://schemas.microsoft.com/office/drawing/2014/main" id="{7DBBE5F8-EB03-1640-9E31-56DC3F7CB5E2}"/>
-              </a:ext>
-            </a:extLst>
-          </p:cNvPr>
-          <p:cNvSpPr/>
-          <p:nvPr/>
-        </p:nvSpPr>
-        <p:spPr>
-          <a:xfrm>
-            <a:off x="4849541" y="2360098"/>
-            <a:ext cx="3203080" cy="998025"/>
-          </a:xfrm>
-          <a:prstGeom prst="roundRect">
-            <a:avLst/>
-          </a:prstGeom>
-          <a:noFill/>
-          <a:ln w="12700">
-            <a:solidFill>
-              <a:schemeClr val="tx1">
-                <a:lumMod val="50000"/>
-                <a:lumOff val="50000"/>
-              </a:schemeClr>
-            </a:solidFill>
-          </a:ln>
-        </p:spPr>
-        <p:style>
-          <a:lnRef idx="2">
-            <a:schemeClr val="accent1">
-              <a:shade val="50000"/>
-            </a:schemeClr>
-          </a:lnRef>
-          <a:fillRef idx="1">
-            <a:schemeClr val="accent1"/>
-          </a:fillRef>
-          <a:effectRef idx="0">
-            <a:schemeClr val="accent1"/>
-          </a:effectRef>
-          <a:fontRef idx="minor">
-            <a:schemeClr val="lt1"/>
-          </a:fontRef>
-        </p:style>
-        <p:txBody>
-          <a:bodyPr rtlCol="0" anchor="ctr"/>
-          <a:lstStyle/>
-          <a:p>
-            <a:pPr>
-              <a:spcAft>
-                <a:spcPts val="300"/>
-              </a:spcAft>
-            </a:pPr>
-            <a:r>
-              <a:rPr lang="en-US" sz="1200" b="1" dirty="0">
-                <a:solidFill>
-                  <a:srgbClr val="C02B43"/>
-                </a:solidFill>
-              </a:rPr>
-              <a:t>MAKE SENSE AND PERSEVERE</a:t>
-            </a:r>
-            <a:endParaRPr lang="en-IN" sz="1200" b="1" dirty="0">
-              <a:solidFill>
-                <a:srgbClr val="C02B43"/>
-              </a:solidFill>
-            </a:endParaRPr>
-          </a:p>
-          <a:p>
-            <a:r>
-              <a:rPr lang="en-US" sz="1200" dirty="0">
-                <a:solidFill>
-                  <a:schemeClr val="tx1"/>
-                </a:solidFill>
-              </a:rPr>
-              <a:t>In stringed instruments, higher frequencies</a:t>
-            </a:r>
-            <a:br>
-              <a:rPr lang="en-US" sz="1200" dirty="0">
-                <a:solidFill>
-                  <a:schemeClr val="tx1"/>
-                </a:solidFill>
-              </a:rPr>
-            </a:br>
-            <a:r>
-              <a:rPr lang="en-US" sz="1200" dirty="0">
-                <a:solidFill>
-                  <a:schemeClr val="tx1"/>
-                </a:solidFill>
-              </a:rPr>
-              <a:t>result in higher pitched sounds. How does</a:t>
-            </a:r>
-            <a:br>
-              <a:rPr lang="en-US" sz="1200" dirty="0">
-                <a:solidFill>
-                  <a:schemeClr val="tx1"/>
-                </a:solidFill>
-              </a:rPr>
-            </a:br>
-            <a:r>
-              <a:rPr lang="en-US" sz="1200" dirty="0">
-                <a:solidFill>
-                  <a:schemeClr val="tx1"/>
-                </a:solidFill>
-              </a:rPr>
-              <a:t>varying string length affect pitch?</a:t>
-            </a:r>
-            <a:endParaRPr lang="en-IN" sz="1200" dirty="0">
-              <a:solidFill>
-                <a:schemeClr val="tx1"/>
-              </a:solidFill>
-              <a:latin typeface="Arial" panose="020B0604020202020204" pitchFamily="34" charset="0"/>
-              <a:cs typeface="Arial" panose="020B0604020202020204" pitchFamily="34" charset="0"/>
-            </a:endParaRPr>
-          </a:p>
-        </p:txBody>
-      </p:sp>
-      <p:sp>
-        <p:nvSpPr>
-          <p:cNvPr id="3" name="TextBox 2">
-            <a:extLst>
-              <a:ext uri="{FF2B5EF4-FFF2-40B4-BE49-F238E27FC236}">
-                <a16:creationId xmlns:a16="http://schemas.microsoft.com/office/drawing/2014/main" id="{6CD1D25C-E8C2-A99D-0F3D-BE069B346573}"/>
-              </a:ext>
-            </a:extLst>
-          </p:cNvPr>
-          <p:cNvSpPr txBox="1"/>
-          <p:nvPr/>
-        </p:nvSpPr>
-        <p:spPr>
-          <a:xfrm>
-            <a:off x="355758" y="1122573"/>
-            <a:ext cx="8321209" cy="584775"/>
-          </a:xfrm>
-          <a:prstGeom prst="rect">
-            <a:avLst/>
-          </a:prstGeom>
-          <a:noFill/>
-        </p:spPr>
-        <p:txBody>
-          <a:bodyPr wrap="square" rIns="36000" rtlCol="0">
-            <a:spAutoFit/>
-          </a:bodyPr>
-          <a:lstStyle/>
-          <a:p>
-            <a:r>
-              <a:rPr lang="en-US" sz="1600" b="1" dirty="0"/>
-              <a:t>The frequency of a 26-inch E-string is 329.63 cycles per second. What is the frequency when the string length is 13 inches?</a:t>
-            </a:r>
-            <a:endParaRPr lang="en-IN" sz="1600" b="1" dirty="0">
-              <a:solidFill>
-                <a:schemeClr val="tx1"/>
-              </a:solidFill>
-            </a:endParaRPr>
-          </a:p>
-        </p:txBody>
-      </p:sp>
-    </p:spTree>
-    <p:extLst>
-      <p:ext uri="{BB962C8B-B14F-4D97-AF65-F5344CB8AC3E}">
-        <p14:creationId xmlns:p14="http://schemas.microsoft.com/office/powerpoint/2010/main" val="3299242804"/>
-      </p:ext>
-    </p:extLst>
-  </p:cSld>
-  <p:clrMapOvr>
-    <a:masterClrMapping/>
-  </p:clrMapOvr>
-</p:sld>
-</file>
-
-<file path=ppt/slides/slide11.xml><?xml version="1.0" encoding="utf-8"?>
-<p:sld xmlns:a="http://schemas.openxmlformats.org/drawingml/2006/main" xmlns:r="http://schemas.openxmlformats.org/officeDocument/2006/relationships" xmlns:p="http://schemas.openxmlformats.org/presentationml/2006/main">
-  <p:cSld>
-    <p:spTree>
-      <p:nvGrpSpPr>
-        <p:cNvPr id="1" name="Shape 173"/>
-        <p:cNvGrpSpPr/>
-        <p:nvPr/>
-      </p:nvGrpSpPr>
-      <p:grpSpPr>
-        <a:xfrm>
-          <a:off x="0" y="0"/>
-          <a:ext cx="0" cy="0"/>
-          <a:chOff x="0" y="0"/>
-          <a:chExt cx="0" cy="0"/>
-        </a:xfrm>
-      </p:grpSpPr>
-      <p:sp>
-        <p:nvSpPr>
           <p:cNvPr id="15" name="TextBox 14">
             <a:extLst>
               <a:ext uri="{FF2B5EF4-FFF2-40B4-BE49-F238E27FC236}">
@@ -6698,7 +5772,7 @@
 </p:sld>
 </file>
 
-<file path=ppt/slides/slide12.xml><?xml version="1.0" encoding="utf-8"?>
+<file path=ppt/slides/slide11.xml><?xml version="1.0" encoding="utf-8"?>
 <p:sld xmlns:a="http://schemas.openxmlformats.org/drawingml/2006/main" xmlns:r="http://schemas.openxmlformats.org/officeDocument/2006/relationships" xmlns:p="http://schemas.openxmlformats.org/presentationml/2006/main">
   <p:cSld>
     <p:spTree>
@@ -7197,7 +6271,7 @@
 </p:sld>
 </file>
 
-<file path=ppt/slides/slide13.xml><?xml version="1.0" encoding="utf-8"?>
+<file path=ppt/slides/slide12.xml><?xml version="1.0" encoding="utf-8"?>
 <p:sld xmlns:a="http://schemas.openxmlformats.org/drawingml/2006/main" xmlns:r="http://schemas.openxmlformats.org/officeDocument/2006/relationships" xmlns:p="http://schemas.openxmlformats.org/presentationml/2006/main">
   <p:cSld>
     <p:spTree>
@@ -7869,7 +6943,7 @@
 </p:sld>
 </file>
 
-<file path=ppt/slides/slide14.xml><?xml version="1.0" encoding="utf-8"?>
+<file path=ppt/slides/slide13.xml><?xml version="1.0" encoding="utf-8"?>
 <p:sld xmlns:a="http://schemas.openxmlformats.org/drawingml/2006/main" xmlns:r="http://schemas.openxmlformats.org/officeDocument/2006/relationships" xmlns:p="http://schemas.openxmlformats.org/presentationml/2006/main">
   <p:cSld>
     <p:spTree>
@@ -8167,7 +7241,7 @@
 </p:sld>
 </file>
 
-<file path=ppt/slides/slide15.xml><?xml version="1.0" encoding="utf-8"?>
+<file path=ppt/slides/slide14.xml><?xml version="1.0" encoding="utf-8"?>
 <p:sld xmlns:a="http://schemas.openxmlformats.org/drawingml/2006/main" xmlns:r="http://schemas.openxmlformats.org/officeDocument/2006/relationships" xmlns:p="http://schemas.openxmlformats.org/presentationml/2006/main">
   <p:cSld>
     <p:spTree>
@@ -8461,7 +7535,7 @@
 </p:sld>
 </file>
 
-<file path=ppt/slides/slide16.xml><?xml version="1.0" encoding="utf-8"?>
+<file path=ppt/slides/slide15.xml><?xml version="1.0" encoding="utf-8"?>
 <p:sld xmlns:a="http://schemas.openxmlformats.org/drawingml/2006/main" xmlns:r="http://schemas.openxmlformats.org/officeDocument/2006/relationships" xmlns:p="http://schemas.openxmlformats.org/presentationml/2006/main">
   <p:cSld>
     <p:spTree>
@@ -9320,7 +8394,7 @@
 </p:sld>
 </file>
 
-<file path=ppt/slides/slide17.xml><?xml version="1.0" encoding="utf-8"?>
+<file path=ppt/slides/slide16.xml><?xml version="1.0" encoding="utf-8"?>
 <p:sld xmlns:a="http://schemas.openxmlformats.org/drawingml/2006/main" xmlns:r="http://schemas.openxmlformats.org/officeDocument/2006/relationships" xmlns:p="http://schemas.openxmlformats.org/presentationml/2006/main">
   <p:cSld>
     <p:spTree>
@@ -9604,7 +8678,7 @@
 </p:sld>
 </file>
 
-<file path=ppt/slides/slide18.xml><?xml version="1.0" encoding="utf-8"?>
+<file path=ppt/slides/slide17.xml><?xml version="1.0" encoding="utf-8"?>
 <p:sld xmlns:a="http://schemas.openxmlformats.org/drawingml/2006/main" xmlns:r="http://schemas.openxmlformats.org/officeDocument/2006/relationships" xmlns:p="http://schemas.openxmlformats.org/presentationml/2006/main">
   <p:cSld>
     <p:spTree>
@@ -11057,301 +10131,6 @@
 </p:sld>
 </file>
 
-<file path=ppt/slides/slide19.xml><?xml version="1.0" encoding="utf-8"?>
-<p:sld xmlns:a="http://schemas.openxmlformats.org/drawingml/2006/main" xmlns:r="http://schemas.openxmlformats.org/officeDocument/2006/relationships" xmlns:p="http://schemas.openxmlformats.org/presentationml/2006/main">
-  <p:cSld>
-    <p:spTree>
-      <p:nvGrpSpPr>
-        <p:cNvPr id="1" name="Shape 173"/>
-        <p:cNvGrpSpPr/>
-        <p:nvPr/>
-      </p:nvGrpSpPr>
-      <p:grpSpPr>
-        <a:xfrm>
-          <a:off x="0" y="0"/>
-          <a:ext cx="0" cy="0"/>
-          <a:chOff x="0" y="0"/>
-          <a:chExt cx="0" cy="0"/>
-        </a:xfrm>
-      </p:grpSpPr>
-      <p:sp>
-        <p:nvSpPr>
-          <p:cNvPr id="10" name="TextBox 9">
-            <a:extLst>
-              <a:ext uri="{FF2B5EF4-FFF2-40B4-BE49-F238E27FC236}">
-                <a16:creationId xmlns:a16="http://schemas.microsoft.com/office/drawing/2014/main" id="{5E033CF7-964E-904E-B8F6-4DC8B0D5C047}"/>
-              </a:ext>
-            </a:extLst>
-          </p:cNvPr>
-          <p:cNvSpPr txBox="1"/>
-          <p:nvPr/>
-        </p:nvSpPr>
-        <p:spPr>
-          <a:xfrm>
-            <a:off x="353088" y="344265"/>
-            <a:ext cx="8413840" cy="4970591"/>
-          </a:xfrm>
-          <a:prstGeom prst="rect">
-            <a:avLst/>
-          </a:prstGeom>
-          <a:noFill/>
-        </p:spPr>
-        <p:txBody>
-          <a:bodyPr wrap="square" rIns="36000" rtlCol="0">
-            <a:spAutoFit/>
-          </a:bodyPr>
-          <a:lstStyle/>
-          <a:p>
-            <a:pPr>
-              <a:spcAft>
-                <a:spcPts val="1200"/>
-              </a:spcAft>
-              <a:tabLst>
-                <a:tab pos="2041525" algn="l"/>
-              </a:tabLst>
-            </a:pPr>
-            <a:r>
-              <a:rPr lang="en-IN" sz="1800" b="1" dirty="0">
-                <a:solidFill>
-                  <a:srgbClr val="C61938"/>
-                </a:solidFill>
-              </a:rPr>
-              <a:t>Do You </a:t>
-            </a:r>
-            <a:r>
-              <a:rPr lang="en-IN" sz="1800" b="1" cap="all" dirty="0">
-                <a:solidFill>
-                  <a:srgbClr val="C61938"/>
-                </a:solidFill>
-              </a:rPr>
-              <a:t>Understand</a:t>
-            </a:r>
-            <a:r>
-              <a:rPr lang="en-IN" sz="1800" b="1" dirty="0">
-                <a:solidFill>
-                  <a:srgbClr val="C61938"/>
-                </a:solidFill>
-              </a:rPr>
-              <a:t>?</a:t>
-            </a:r>
-          </a:p>
-          <a:p>
-            <a:pPr marL="342900" indent="-342900">
-              <a:spcAft>
-                <a:spcPts val="1200"/>
-              </a:spcAft>
-              <a:buFont typeface="+mj-lt"/>
-              <a:buAutoNum type="arabicPeriod"/>
-            </a:pPr>
-            <a:r>
-              <a:rPr lang="en-US" sz="1600" b="1" dirty="0">
-                <a:solidFill>
-                  <a:schemeClr val="bg1"/>
-                </a:solidFill>
-                <a:highlight>
-                  <a:srgbClr val="168446"/>
-                </a:highlight>
-              </a:rPr>
-              <a:t> </a:t>
-            </a:r>
-            <a:r>
-              <a:rPr lang="en-IN" sz="1600" b="1" cap="all" dirty="0">
-                <a:solidFill>
-                  <a:schemeClr val="bg1"/>
-                </a:solidFill>
-                <a:highlight>
-                  <a:srgbClr val="168446"/>
-                </a:highlight>
-              </a:rPr>
-              <a:t>Essential Question </a:t>
-            </a:r>
-            <a:r>
-              <a:rPr lang="en-US" sz="1600" dirty="0"/>
-              <a:t> How are inverse variations related to the reciprocal function?</a:t>
-            </a:r>
-          </a:p>
-          <a:p>
-            <a:pPr marL="342900" indent="-342900">
-              <a:spcAft>
-                <a:spcPts val="18600"/>
-              </a:spcAft>
-              <a:buFont typeface="+mj-lt"/>
-              <a:buAutoNum type="arabicPeriod"/>
-            </a:pPr>
-            <a:r>
-              <a:rPr lang="en-US" sz="1600" b="1" dirty="0">
-                <a:solidFill>
-                  <a:srgbClr val="C02B43"/>
-                </a:solidFill>
-              </a:rPr>
-              <a:t>Construct Arguments </a:t>
-            </a:r>
-            <a:r>
-              <a:rPr lang="en-US" sz="1600" dirty="0"/>
-              <a:t>Explain why the amount of propane in a grill’s tank and the time spent grilling could represent an inverse variation.</a:t>
-            </a:r>
-            <a:endParaRPr lang="it-IT" sz="1600" dirty="0"/>
-          </a:p>
-          <a:p>
-            <a:pPr marL="360000" indent="-378000">
-              <a:spcAft>
-                <a:spcPts val="1200"/>
-              </a:spcAft>
-              <a:buFont typeface="+mj-lt"/>
-              <a:buAutoNum type="arabicPeriod"/>
-            </a:pPr>
-            <a:r>
-              <a:rPr lang="en-US" sz="1600" b="1" dirty="0">
-                <a:solidFill>
-                  <a:srgbClr val="90057A"/>
-                </a:solidFill>
-              </a:rPr>
-              <a:t>Vocabulary</a:t>
-            </a:r>
-            <a:r>
-              <a:rPr lang="en-US" sz="1600" dirty="0"/>
-              <a:t> Why is it impossible for the graph of the function          to intersect the horizontal asymptote at the </a:t>
-            </a:r>
-            <a:r>
-              <a:rPr lang="en-US" sz="1600" i="1" dirty="0"/>
-              <a:t>x</a:t>
-            </a:r>
-            <a:r>
-              <a:rPr lang="en-US" sz="1600" dirty="0"/>
-              <a:t>-axis?</a:t>
-            </a:r>
-          </a:p>
-          <a:p>
-            <a:pPr marL="360000" indent="-378000">
-              <a:spcAft>
-                <a:spcPts val="1200"/>
-              </a:spcAft>
-              <a:buFont typeface="+mj-lt"/>
-              <a:buAutoNum type="arabicPeriod"/>
-            </a:pPr>
-            <a:r>
-              <a:rPr lang="en-US" sz="1600" b="1" dirty="0">
-                <a:solidFill>
-                  <a:srgbClr val="C02B43"/>
-                </a:solidFill>
-              </a:rPr>
-              <a:t>Error Analysis </a:t>
-            </a:r>
-            <a:r>
-              <a:rPr lang="en-US" sz="1600" dirty="0"/>
-              <a:t>Carmen said the table of values shown represents an inverse variation. Explain why Carmen is mistaken.</a:t>
-            </a:r>
-            <a:endParaRPr lang="en-IN" sz="1600" dirty="0">
-              <a:solidFill>
-                <a:schemeClr val="tx1"/>
-              </a:solidFill>
-            </a:endParaRPr>
-          </a:p>
-        </p:txBody>
-      </p:sp>
-      <p:pic>
-        <p:nvPicPr>
-          <p:cNvPr id="4" name="Picture 3" descr="Screen Shot 2022-04-07 at 1.07.25 PM.png"/>
-          <p:cNvPicPr>
-            <a:picLocks noChangeAspect="1"/>
-          </p:cNvPicPr>
-          <p:nvPr/>
-        </p:nvPicPr>
-        <p:blipFill>
-          <a:blip r:embed="rId3">
-            <a:extLst>
-              <a:ext uri="{28A0092B-C50C-407E-A947-70E740481C1C}">
-                <a14:useLocalDpi xmlns:a14="http://schemas.microsoft.com/office/drawing/2010/main" val="0"/>
-              </a:ext>
-            </a:extLst>
-          </a:blip>
-          <a:stretch>
-            <a:fillRect/>
-          </a:stretch>
-        </p:blipFill>
-        <p:spPr>
-          <a:xfrm>
-            <a:off x="713918" y="5385945"/>
-            <a:ext cx="3214007" cy="796787"/>
-          </a:xfrm>
-          <a:prstGeom prst="rect">
-            <a:avLst/>
-          </a:prstGeom>
-        </p:spPr>
-      </p:pic>
-      <p:pic>
-        <p:nvPicPr>
-          <p:cNvPr id="7" name="Picture 6">
-            <a:extLst>
-              <a:ext uri="{FF2B5EF4-FFF2-40B4-BE49-F238E27FC236}">
-                <a16:creationId xmlns:a16="http://schemas.microsoft.com/office/drawing/2014/main" id="{60766E0E-3643-B356-75F0-7A968A53B169}"/>
-              </a:ext>
-            </a:extLst>
-          </p:cNvPr>
-          <p:cNvPicPr>
-            <a:picLocks noChangeAspect="1"/>
-          </p:cNvPicPr>
-          <p:nvPr/>
-        </p:nvPicPr>
-        <p:blipFill>
-          <a:blip r:embed="rId4"/>
-          <a:stretch>
-            <a:fillRect/>
-          </a:stretch>
-        </p:blipFill>
-        <p:spPr>
-          <a:xfrm>
-            <a:off x="6335182" y="4061234"/>
-            <a:ext cx="481760" cy="294871"/>
-          </a:xfrm>
-          <a:prstGeom prst="rect">
-            <a:avLst/>
-          </a:prstGeom>
-        </p:spPr>
-      </p:pic>
-      <p:pic>
-        <p:nvPicPr>
-          <p:cNvPr id="11" name="Picture 10">
-            <a:extLst>
-              <a:ext uri="{FF2B5EF4-FFF2-40B4-BE49-F238E27FC236}">
-                <a16:creationId xmlns:a16="http://schemas.microsoft.com/office/drawing/2014/main" id="{ABF3B394-52AB-E49B-60BB-5F2658C2CDDD}"/>
-              </a:ext>
-            </a:extLst>
-          </p:cNvPr>
-          <p:cNvPicPr>
-            <a:picLocks noChangeAspect="1"/>
-          </p:cNvPicPr>
-          <p:nvPr/>
-        </p:nvPicPr>
-        <p:blipFill>
-          <a:blip r:embed="rId5"/>
-          <a:stretch>
-            <a:fillRect/>
-          </a:stretch>
-        </p:blipFill>
-        <p:spPr>
-          <a:xfrm>
-            <a:off x="3613279" y="1763253"/>
-            <a:ext cx="1842025" cy="2348314"/>
-          </a:xfrm>
-          <a:prstGeom prst="rect">
-            <a:avLst/>
-          </a:prstGeom>
-        </p:spPr>
-      </p:pic>
-    </p:spTree>
-    <p:extLst>
-      <p:ext uri="{BB962C8B-B14F-4D97-AF65-F5344CB8AC3E}">
-        <p14:creationId xmlns:p14="http://schemas.microsoft.com/office/powerpoint/2010/main" val="1087053607"/>
-      </p:ext>
-    </p:extLst>
-  </p:cSld>
-  <p:clrMapOvr>
-    <a:masterClrMapping/>
-  </p:clrMapOvr>
-</p:sld>
-</file>
-
 <file path=ppt/slides/slide2.xml><?xml version="1.0" encoding="utf-8"?>
 <p:sld xmlns:a="http://schemas.openxmlformats.org/drawingml/2006/main" xmlns:r="http://schemas.openxmlformats.org/officeDocument/2006/relationships" xmlns:p="http://schemas.openxmlformats.org/presentationml/2006/main">
   <p:cSld>
@@ -11605,284 +10384,6 @@
     <p:extLst>
       <p:ext uri="{BB962C8B-B14F-4D97-AF65-F5344CB8AC3E}">
         <p14:creationId xmlns:p14="http://schemas.microsoft.com/office/powerpoint/2010/main" val="1747861727"/>
-      </p:ext>
-    </p:extLst>
-  </p:cSld>
-  <p:clrMapOvr>
-    <a:masterClrMapping/>
-  </p:clrMapOvr>
-</p:sld>
-</file>
-
-<file path=ppt/slides/slide20.xml><?xml version="1.0" encoding="utf-8"?>
-<p:sld xmlns:a="http://schemas.openxmlformats.org/drawingml/2006/main" xmlns:r="http://schemas.openxmlformats.org/officeDocument/2006/relationships" xmlns:p="http://schemas.openxmlformats.org/presentationml/2006/main">
-  <p:cSld>
-    <p:spTree>
-      <p:nvGrpSpPr>
-        <p:cNvPr id="1" name="Shape 173"/>
-        <p:cNvGrpSpPr/>
-        <p:nvPr/>
-      </p:nvGrpSpPr>
-      <p:grpSpPr>
-        <a:xfrm>
-          <a:off x="0" y="0"/>
-          <a:ext cx="0" cy="0"/>
-          <a:chOff x="0" y="0"/>
-          <a:chExt cx="0" cy="0"/>
-        </a:xfrm>
-      </p:grpSpPr>
-      <p:pic>
-        <p:nvPicPr>
-          <p:cNvPr id="7" name="Picture 6">
-            <a:extLst>
-              <a:ext uri="{FF2B5EF4-FFF2-40B4-BE49-F238E27FC236}">
-                <a16:creationId xmlns:a16="http://schemas.microsoft.com/office/drawing/2014/main" id="{E1554FDA-2209-6A45-8EEF-3FAF29089B69}"/>
-              </a:ext>
-            </a:extLst>
-          </p:cNvPr>
-          <p:cNvPicPr>
-            <a:picLocks noChangeAspect="1"/>
-          </p:cNvPicPr>
-          <p:nvPr/>
-        </p:nvPicPr>
-        <p:blipFill>
-          <a:blip r:embed="rId3"/>
-          <a:stretch>
-            <a:fillRect/>
-          </a:stretch>
-        </p:blipFill>
-        <p:spPr>
-          <a:xfrm>
-            <a:off x="797857" y="2670218"/>
-            <a:ext cx="3098570" cy="2403686"/>
-          </a:xfrm>
-          <a:prstGeom prst="rect">
-            <a:avLst/>
-          </a:prstGeom>
-        </p:spPr>
-      </p:pic>
-      <p:sp>
-        <p:nvSpPr>
-          <p:cNvPr id="2" name="TextBox 1">
-            <a:extLst>
-              <a:ext uri="{FF2B5EF4-FFF2-40B4-BE49-F238E27FC236}">
-                <a16:creationId xmlns:a16="http://schemas.microsoft.com/office/drawing/2014/main" id="{C7428F59-1FFF-EAFF-766E-87A85BF5B15A}"/>
-              </a:ext>
-            </a:extLst>
-          </p:cNvPr>
-          <p:cNvSpPr txBox="1"/>
-          <p:nvPr/>
-        </p:nvSpPr>
-        <p:spPr>
-          <a:xfrm>
-            <a:off x="355758" y="344265"/>
-            <a:ext cx="8371682" cy="2231380"/>
-          </a:xfrm>
-          <a:prstGeom prst="rect">
-            <a:avLst/>
-          </a:prstGeom>
-          <a:noFill/>
-        </p:spPr>
-        <p:txBody>
-          <a:bodyPr wrap="square" rIns="36000" rtlCol="0">
-            <a:spAutoFit/>
-          </a:bodyPr>
-          <a:lstStyle/>
-          <a:p>
-            <a:pPr>
-              <a:spcAft>
-                <a:spcPts val="600"/>
-              </a:spcAft>
-              <a:tabLst>
-                <a:tab pos="2041525" algn="l"/>
-              </a:tabLst>
-            </a:pPr>
-            <a:r>
-              <a:rPr lang="en-IN" sz="1800" b="1" dirty="0">
-                <a:solidFill>
-                  <a:srgbClr val="C61938"/>
-                </a:solidFill>
-              </a:rPr>
-              <a:t>Do You </a:t>
-            </a:r>
-            <a:r>
-              <a:rPr lang="en-IN" sz="1800" b="1" cap="all" dirty="0">
-                <a:solidFill>
-                  <a:srgbClr val="C61938"/>
-                </a:solidFill>
-              </a:rPr>
-              <a:t>Know How</a:t>
-            </a:r>
-            <a:r>
-              <a:rPr lang="en-IN" sz="1800" b="1" dirty="0">
-                <a:solidFill>
-                  <a:srgbClr val="C61938"/>
-                </a:solidFill>
-              </a:rPr>
-              <a:t>?</a:t>
-            </a:r>
-          </a:p>
-          <a:p>
-            <a:pPr marL="342900" indent="-342900">
-              <a:spcAft>
-                <a:spcPts val="1200"/>
-              </a:spcAft>
-              <a:buFont typeface="+mj-lt"/>
-              <a:buAutoNum type="arabicPeriod" startAt="5"/>
-            </a:pPr>
-            <a:r>
-              <a:rPr lang="en-IN" sz="1600" b="1" dirty="0"/>
-              <a:t>​</a:t>
-            </a:r>
-            <a:r>
-              <a:rPr lang="en-US" sz="1600" dirty="0"/>
-              <a:t>In an inverse variation, </a:t>
-            </a:r>
-            <a:r>
-              <a:rPr lang="en-US" sz="1600" i="1" dirty="0"/>
-              <a:t>x</a:t>
-            </a:r>
-            <a:r>
-              <a:rPr lang="en-US" sz="1600" dirty="0"/>
-              <a:t> = −8 when           </a:t>
-            </a:r>
-            <a:r>
-              <a:rPr lang="en-US" sz="1100" dirty="0"/>
-              <a:t>  </a:t>
-            </a:r>
-            <a:r>
-              <a:rPr lang="en-US" sz="1600" dirty="0"/>
-              <a:t>What is the value of </a:t>
-            </a:r>
-            <a:r>
-              <a:rPr lang="en-US" sz="1600" i="1" dirty="0"/>
-              <a:t>y</a:t>
-            </a:r>
-            <a:r>
-              <a:rPr lang="en-US" sz="1600" dirty="0"/>
-              <a:t> when </a:t>
-            </a:r>
-            <a:r>
-              <a:rPr lang="en-US" sz="1600" i="1" dirty="0"/>
-              <a:t>x</a:t>
-            </a:r>
-            <a:r>
-              <a:rPr lang="en-US" sz="1600" dirty="0"/>
-              <a:t> = 4?</a:t>
-            </a:r>
-          </a:p>
-          <a:p>
-            <a:pPr marL="342900" indent="-342900">
-              <a:spcAft>
-                <a:spcPts val="1200"/>
-              </a:spcAft>
-              <a:buFont typeface="+mj-lt"/>
-              <a:buAutoNum type="arabicPeriod" startAt="5"/>
-            </a:pPr>
-            <a:r>
-              <a:rPr lang="en-IN" sz="1600" b="1" dirty="0"/>
-              <a:t>​</a:t>
-            </a:r>
-            <a:r>
-              <a:rPr lang="en-US" sz="1600" dirty="0"/>
-              <a:t>What are the equations of the asymptotes of the function                         </a:t>
-            </a:r>
-            <a:br>
-              <a:rPr lang="en-US" sz="1600" dirty="0"/>
-            </a:br>
-            <a:r>
-              <a:rPr lang="en-US" sz="1600" dirty="0"/>
-              <a:t>What are the domain and range?</a:t>
-            </a:r>
-          </a:p>
-          <a:p>
-            <a:pPr marL="342900" indent="-342900">
-              <a:spcAft>
-                <a:spcPts val="1200"/>
-              </a:spcAft>
-              <a:buFont typeface="+mj-lt"/>
-              <a:buAutoNum type="arabicPeriod" startAt="5"/>
-            </a:pPr>
-            <a:r>
-              <a:rPr lang="en-IN" sz="1600" b="1" dirty="0"/>
-              <a:t>​</a:t>
-            </a:r>
-            <a:r>
-              <a:rPr lang="en-US" sz="1600" dirty="0"/>
-              <a:t>Until the truck runs out of gas, the amount of gas in its fuel tank varies inversely with the number of miles traveled. Model a relationship between the amount of gas in a fuel tank of a truck and the number of miles traveled by the truck as an inverse variation.</a:t>
-            </a:r>
-            <a:endParaRPr lang="en-IN" sz="1600" baseline="30000" dirty="0">
-              <a:solidFill>
-                <a:schemeClr val="tx1"/>
-              </a:solidFill>
-            </a:endParaRPr>
-          </a:p>
-        </p:txBody>
-      </p:sp>
-      <p:pic>
-        <p:nvPicPr>
-          <p:cNvPr id="6" name="Picture 5">
-            <a:extLst>
-              <a:ext uri="{FF2B5EF4-FFF2-40B4-BE49-F238E27FC236}">
-                <a16:creationId xmlns:a16="http://schemas.microsoft.com/office/drawing/2014/main" id="{C8AEA234-4C00-933D-E207-137422904C45}"/>
-              </a:ext>
-            </a:extLst>
-          </p:cNvPr>
-          <p:cNvPicPr>
-            <a:picLocks noChangeAspect="1"/>
-          </p:cNvPicPr>
-          <p:nvPr/>
-        </p:nvPicPr>
-        <p:blipFill>
-          <a:blip r:embed="rId4"/>
-          <a:stretch>
-            <a:fillRect/>
-          </a:stretch>
-        </p:blipFill>
-        <p:spPr>
-          <a:xfrm>
-            <a:off x="4030492" y="724741"/>
-            <a:ext cx="628013" cy="314005"/>
-          </a:xfrm>
-          <a:prstGeom prst="rect">
-            <a:avLst/>
-          </a:prstGeom>
-        </p:spPr>
-      </p:pic>
-      <p:pic>
-        <p:nvPicPr>
-          <p:cNvPr id="5" name="Picture 4">
-            <a:extLst>
-              <a:ext uri="{FF2B5EF4-FFF2-40B4-BE49-F238E27FC236}">
-                <a16:creationId xmlns:a16="http://schemas.microsoft.com/office/drawing/2014/main" id="{CF8666D1-2D7F-21EF-D74B-9922F3A3F5E2}"/>
-              </a:ext>
-            </a:extLst>
-          </p:cNvPr>
-          <p:cNvPicPr>
-            <a:picLocks noChangeAspect="1"/>
-          </p:cNvPicPr>
-          <p:nvPr/>
-        </p:nvPicPr>
-        <p:blipFill>
-          <a:blip r:embed="rId5"/>
-          <a:stretch>
-            <a:fillRect/>
-          </a:stretch>
-        </p:blipFill>
-        <p:spPr>
-          <a:xfrm>
-            <a:off x="5921256" y="1141416"/>
-            <a:ext cx="1347682" cy="311483"/>
-          </a:xfrm>
-          <a:prstGeom prst="rect">
-            <a:avLst/>
-          </a:prstGeom>
-        </p:spPr>
-      </p:pic>
-    </p:spTree>
-    <p:extLst>
-      <p:ext uri="{BB962C8B-B14F-4D97-AF65-F5344CB8AC3E}">
-        <p14:creationId xmlns:p14="http://schemas.microsoft.com/office/powerpoint/2010/main" val="1389967839"/>
       </p:ext>
     </p:extLst>
   </p:cSld>
@@ -13157,269 +11658,6 @@
       </p:grpSpPr>
       <p:sp>
         <p:nvSpPr>
-          <p:cNvPr id="8" name="TextBox 7">
-            <a:extLst>
-              <a:ext uri="{FF2B5EF4-FFF2-40B4-BE49-F238E27FC236}">
-                <a16:creationId xmlns:a16="http://schemas.microsoft.com/office/drawing/2014/main" id="{E2AF600D-6F8E-AF4F-9F8A-7A6BE3BFBF7F}"/>
-              </a:ext>
-            </a:extLst>
-          </p:cNvPr>
-          <p:cNvSpPr txBox="1"/>
-          <p:nvPr/>
-        </p:nvSpPr>
-        <p:spPr>
-          <a:xfrm>
-            <a:off x="355758" y="378983"/>
-            <a:ext cx="8341433" cy="369332"/>
-          </a:xfrm>
-          <a:prstGeom prst="rect">
-            <a:avLst/>
-          </a:prstGeom>
-          <a:noFill/>
-        </p:spPr>
-        <p:txBody>
-          <a:bodyPr wrap="square" rIns="36000" rtlCol="0">
-            <a:spAutoFit/>
-          </a:bodyPr>
-          <a:lstStyle/>
-          <a:p>
-            <a:pPr>
-              <a:spcAft>
-                <a:spcPts val="600"/>
-              </a:spcAft>
-            </a:pPr>
-            <a:r>
-              <a:rPr lang="en-IN" sz="1800" b="1" dirty="0">
-                <a:solidFill>
-                  <a:srgbClr val="137F97"/>
-                </a:solidFill>
-              </a:rPr>
-              <a:t>CONCEPT </a:t>
-            </a:r>
-            <a:r>
-              <a:rPr lang="fr-FR" sz="1800" b="1" dirty="0">
-                <a:solidFill>
-                  <a:srgbClr val="58585A"/>
-                </a:solidFill>
-              </a:rPr>
-              <a:t>Inverse Variation</a:t>
-            </a:r>
-            <a:endParaRPr lang="en-IN" sz="1800" b="1" dirty="0">
-              <a:solidFill>
-                <a:srgbClr val="58585A"/>
-              </a:solidFill>
-            </a:endParaRPr>
-          </a:p>
-        </p:txBody>
-      </p:sp>
-      <p:sp>
-        <p:nvSpPr>
-          <p:cNvPr id="9" name="TextBox 8"/>
-          <p:cNvSpPr txBox="1"/>
-          <p:nvPr/>
-        </p:nvSpPr>
-        <p:spPr>
-          <a:xfrm>
-            <a:off x="381002" y="777863"/>
-            <a:ext cx="8254997" cy="777136"/>
-          </a:xfrm>
-          <a:prstGeom prst="rect">
-            <a:avLst/>
-          </a:prstGeom>
-          <a:noFill/>
-        </p:spPr>
-        <p:txBody>
-          <a:bodyPr wrap="square" rtlCol="0">
-            <a:spAutoFit/>
-          </a:bodyPr>
-          <a:lstStyle/>
-          <a:p>
-            <a:pPr>
-              <a:spcAft>
-                <a:spcPts val="300"/>
-              </a:spcAft>
-            </a:pPr>
-            <a:r>
-              <a:rPr lang="en-US" dirty="0"/>
-              <a:t>When a relation between </a:t>
-            </a:r>
-            <a:r>
-              <a:rPr lang="en-US" i="1" dirty="0"/>
-              <a:t>x</a:t>
-            </a:r>
-            <a:r>
-              <a:rPr lang="en-US" dirty="0"/>
-              <a:t> and </a:t>
-            </a:r>
-            <a:r>
-              <a:rPr lang="en-US" i="1" dirty="0"/>
-              <a:t>y</a:t>
-            </a:r>
-            <a:r>
-              <a:rPr lang="en-US" dirty="0"/>
-              <a:t> is an inverse variation, we say that </a:t>
-            </a:r>
-            <a:r>
-              <a:rPr lang="en-US" i="1" dirty="0"/>
-              <a:t>x</a:t>
-            </a:r>
-            <a:r>
-              <a:rPr lang="en-US" dirty="0"/>
-              <a:t> varies inversely as </a:t>
-            </a:r>
-            <a:r>
-              <a:rPr lang="en-US" i="1" dirty="0"/>
-              <a:t>y</a:t>
-            </a:r>
-            <a:r>
-              <a:rPr lang="en-US" dirty="0"/>
-              <a:t>. Inverse</a:t>
-            </a:r>
-          </a:p>
-          <a:p>
-            <a:pPr>
-              <a:spcAft>
-                <a:spcPts val="600"/>
-              </a:spcAft>
-            </a:pPr>
-            <a:r>
-              <a:rPr lang="en-US" dirty="0"/>
-              <a:t>variation is modeled by the equation          </a:t>
-            </a:r>
-            <a:r>
-              <a:rPr lang="en-US" sz="1050" dirty="0"/>
-              <a:t> </a:t>
-            </a:r>
-            <a:r>
-              <a:rPr lang="en-US" sz="600" dirty="0"/>
-              <a:t> </a:t>
-            </a:r>
-            <a:r>
-              <a:rPr lang="en-US" sz="1200" dirty="0"/>
-              <a:t> </a:t>
-            </a:r>
-            <a:r>
-              <a:rPr lang="en-US" dirty="0"/>
-              <a:t>where </a:t>
-            </a:r>
-            <a:r>
-              <a:rPr lang="en-US" i="1" dirty="0"/>
-              <a:t>k</a:t>
-            </a:r>
-            <a:r>
-              <a:rPr lang="en-US" dirty="0"/>
-              <a:t> ≠ 0. The variable </a:t>
-            </a:r>
-            <a:r>
-              <a:rPr lang="en-US" i="1" dirty="0"/>
-              <a:t>k</a:t>
-            </a:r>
-            <a:r>
-              <a:rPr lang="en-US" dirty="0"/>
-              <a:t> represents the constant</a:t>
-            </a:r>
-            <a:br>
-              <a:rPr lang="en-US" dirty="0"/>
-            </a:br>
-            <a:r>
-              <a:rPr lang="en-US" dirty="0"/>
-              <a:t>of variation, the number that relates the two variables in an inverse variation.</a:t>
-            </a:r>
-          </a:p>
-        </p:txBody>
-      </p:sp>
-      <p:pic>
-        <p:nvPicPr>
-          <p:cNvPr id="5" name="Picture 4">
-            <a:extLst>
-              <a:ext uri="{FF2B5EF4-FFF2-40B4-BE49-F238E27FC236}">
-                <a16:creationId xmlns:a16="http://schemas.microsoft.com/office/drawing/2014/main" id="{0F062D92-5CE5-76A9-AB1D-17222BC354B4}"/>
-              </a:ext>
-            </a:extLst>
-          </p:cNvPr>
-          <p:cNvPicPr>
-            <a:picLocks noChangeAspect="1"/>
-          </p:cNvPicPr>
-          <p:nvPr/>
-        </p:nvPicPr>
-        <p:blipFill>
-          <a:blip r:embed="rId3"/>
-          <a:stretch>
-            <a:fillRect/>
-          </a:stretch>
-        </p:blipFill>
-        <p:spPr>
-          <a:xfrm>
-            <a:off x="324089" y="1636093"/>
-            <a:ext cx="7137191" cy="1868265"/>
-          </a:xfrm>
-          <a:prstGeom prst="rect">
-            <a:avLst/>
-          </a:prstGeom>
-        </p:spPr>
-      </p:pic>
-      <p:pic>
-        <p:nvPicPr>
-          <p:cNvPr id="6" name="Picture 5">
-            <a:extLst>
-              <a:ext uri="{FF2B5EF4-FFF2-40B4-BE49-F238E27FC236}">
-                <a16:creationId xmlns:a16="http://schemas.microsoft.com/office/drawing/2014/main" id="{27EC2BB1-9C7D-592A-74C1-1609F052B2D7}"/>
-              </a:ext>
-            </a:extLst>
-          </p:cNvPr>
-          <p:cNvPicPr>
-            <a:picLocks noChangeAspect="1"/>
-          </p:cNvPicPr>
-          <p:nvPr/>
-        </p:nvPicPr>
-        <p:blipFill>
-          <a:blip r:embed="rId4"/>
-          <a:stretch>
-            <a:fillRect/>
-          </a:stretch>
-        </p:blipFill>
-        <p:spPr>
-          <a:xfrm>
-            <a:off x="3330141" y="1034756"/>
-            <a:ext cx="519888" cy="288826"/>
-          </a:xfrm>
-          <a:prstGeom prst="rect">
-            <a:avLst/>
-          </a:prstGeom>
-        </p:spPr>
-      </p:pic>
-    </p:spTree>
-    <p:extLst>
-      <p:ext uri="{BB962C8B-B14F-4D97-AF65-F5344CB8AC3E}">
-        <p14:creationId xmlns:p14="http://schemas.microsoft.com/office/powerpoint/2010/main" val="1062313780"/>
-      </p:ext>
-    </p:extLst>
-  </p:cSld>
-  <p:clrMapOvr>
-    <a:masterClrMapping/>
-  </p:clrMapOvr>
-</p:sld>
-</file>
-
-<file path=ppt/slides/slide7.xml><?xml version="1.0" encoding="utf-8"?>
-<p:sld xmlns:a="http://schemas.openxmlformats.org/drawingml/2006/main" xmlns:r="http://schemas.openxmlformats.org/officeDocument/2006/relationships" xmlns:p="http://schemas.openxmlformats.org/presentationml/2006/main">
-  <p:cSld>
-    <p:spTree>
-      <p:nvGrpSpPr>
-        <p:cNvPr id="1" name="Shape 173"/>
-        <p:cNvGrpSpPr/>
-        <p:nvPr/>
-      </p:nvGrpSpPr>
-      <p:grpSpPr>
-        <a:xfrm>
-          <a:off x="0" y="0"/>
-          <a:ext cx="0" cy="0"/>
-          <a:chOff x="0" y="0"/>
-          <a:chExt cx="0" cy="0"/>
-        </a:xfrm>
-      </p:grpSpPr>
-      <p:sp>
-        <p:nvSpPr>
           <p:cNvPr id="4" name="TextBox 3">
             <a:extLst>
               <a:ext uri="{FF2B5EF4-FFF2-40B4-BE49-F238E27FC236}">
@@ -13983,7 +12221,7 @@
 </p:sld>
 </file>
 
-<file path=ppt/slides/slide8.xml><?xml version="1.0" encoding="utf-8"?>
+<file path=ppt/slides/slide7.xml><?xml version="1.0" encoding="utf-8"?>
 <p:sld xmlns:a="http://schemas.openxmlformats.org/drawingml/2006/main" xmlns:r="http://schemas.openxmlformats.org/officeDocument/2006/relationships" xmlns:p="http://schemas.openxmlformats.org/presentationml/2006/main">
   <p:cSld>
     <p:spTree>
@@ -14335,7 +12573,7 @@
 </p:sld>
 </file>
 
-<file path=ppt/slides/slide9.xml><?xml version="1.0" encoding="utf-8"?>
+<file path=ppt/slides/slide8.xml><?xml version="1.0" encoding="utf-8"?>
 <p:sld xmlns:a="http://schemas.openxmlformats.org/drawingml/2006/main" xmlns:r="http://schemas.openxmlformats.org/officeDocument/2006/relationships" xmlns:p="http://schemas.openxmlformats.org/presentationml/2006/main">
   <p:cSld>
     <p:spTree>
@@ -14758,6 +12996,484 @@
     <p:extLst>
       <p:ext uri="{BB962C8B-B14F-4D97-AF65-F5344CB8AC3E}">
         <p14:creationId xmlns:p14="http://schemas.microsoft.com/office/powerpoint/2010/main" val="2370629198"/>
+      </p:ext>
+    </p:extLst>
+  </p:cSld>
+  <p:clrMapOvr>
+    <a:masterClrMapping/>
+  </p:clrMapOvr>
+</p:sld>
+</file>
+
+<file path=ppt/slides/slide9.xml><?xml version="1.0" encoding="utf-8"?>
+<p:sld xmlns:a="http://schemas.openxmlformats.org/drawingml/2006/main" xmlns:r="http://schemas.openxmlformats.org/officeDocument/2006/relationships" xmlns:p="http://schemas.openxmlformats.org/presentationml/2006/main">
+  <p:cSld>
+    <p:spTree>
+      <p:nvGrpSpPr>
+        <p:cNvPr id="1" name="Shape 173"/>
+        <p:cNvGrpSpPr/>
+        <p:nvPr/>
+      </p:nvGrpSpPr>
+      <p:grpSpPr>
+        <a:xfrm>
+          <a:off x="0" y="0"/>
+          <a:ext cx="0" cy="0"/>
+          <a:chOff x="0" y="0"/>
+          <a:chExt cx="0" cy="0"/>
+        </a:xfrm>
+      </p:grpSpPr>
+      <p:sp>
+        <p:nvSpPr>
+          <p:cNvPr id="5" name="TextBox 4">
+            <a:extLst>
+              <a:ext uri="{FF2B5EF4-FFF2-40B4-BE49-F238E27FC236}">
+                <a16:creationId xmlns:a16="http://schemas.microsoft.com/office/drawing/2014/main" id="{6E8F0502-F26D-4842-97A7-E6A7B55ABA0B}"/>
+              </a:ext>
+            </a:extLst>
+          </p:cNvPr>
+          <p:cNvSpPr txBox="1"/>
+          <p:nvPr/>
+        </p:nvSpPr>
+        <p:spPr>
+          <a:xfrm>
+            <a:off x="355758" y="706927"/>
+            <a:ext cx="8321209" cy="5504071"/>
+          </a:xfrm>
+          <a:prstGeom prst="rect">
+            <a:avLst/>
+          </a:prstGeom>
+          <a:noFill/>
+        </p:spPr>
+        <p:txBody>
+          <a:bodyPr wrap="square" rIns="36000" rtlCol="0">
+            <a:spAutoFit/>
+          </a:bodyPr>
+          <a:lstStyle/>
+          <a:p>
+            <a:pPr>
+              <a:spcAft>
+                <a:spcPts val="6200"/>
+              </a:spcAft>
+              <a:tabLst>
+                <a:tab pos="1584000" algn="l"/>
+              </a:tabLst>
+            </a:pPr>
+            <a:r>
+              <a:rPr lang="en-IN" sz="1800" b="1" dirty="0">
+                <a:solidFill>
+                  <a:srgbClr val="0078AE"/>
+                </a:solidFill>
+              </a:rPr>
+              <a:t>	</a:t>
+            </a:r>
+            <a:r>
+              <a:rPr lang="de-DE" sz="1800" b="1" dirty="0">
+                <a:solidFill>
+                  <a:srgbClr val="58585A"/>
+                </a:solidFill>
+              </a:rPr>
+              <a:t>Use an Inverse Variation Model</a:t>
+            </a:r>
+            <a:endParaRPr lang="en-US" sz="1800" b="1" dirty="0">
+              <a:solidFill>
+                <a:srgbClr val="58585A"/>
+              </a:solidFill>
+            </a:endParaRPr>
+          </a:p>
+          <a:p>
+            <a:pPr>
+              <a:spcAft>
+                <a:spcPts val="13200"/>
+              </a:spcAft>
+            </a:pPr>
+            <a:r>
+              <a:rPr lang="en-US" b="1" dirty="0"/>
+              <a:t>Step 1</a:t>
+            </a:r>
+            <a:r>
+              <a:rPr lang="en-US" dirty="0"/>
+              <a:t>   Write the equation for an inverse variation and solve for </a:t>
+            </a:r>
+            <a:r>
+              <a:rPr lang="en-US" i="1" dirty="0"/>
+              <a:t>k</a:t>
+            </a:r>
+            <a:r>
+              <a:rPr lang="en-US" dirty="0"/>
+              <a:t>.</a:t>
+            </a:r>
+          </a:p>
+          <a:p>
+            <a:pPr>
+              <a:spcAft>
+                <a:spcPts val="15600"/>
+              </a:spcAft>
+            </a:pPr>
+            <a:r>
+              <a:rPr lang="en-US" b="1" dirty="0"/>
+              <a:t>Step 2</a:t>
+            </a:r>
+            <a:r>
+              <a:rPr lang="en-US" dirty="0"/>
+              <a:t>   Substitute </a:t>
+            </a:r>
+            <a:r>
+              <a:rPr lang="en-US" i="1" dirty="0"/>
+              <a:t>k</a:t>
+            </a:r>
+            <a:r>
+              <a:rPr lang="en-US" dirty="0"/>
+              <a:t> = 8,570.38 in the inverse variation equation and then find </a:t>
+            </a:r>
+            <a:r>
+              <a:rPr lang="en-US" i="1" dirty="0"/>
+              <a:t>f</a:t>
+            </a:r>
+            <a:r>
+              <a:rPr lang="en-US" dirty="0"/>
+              <a:t>.</a:t>
+            </a:r>
+          </a:p>
+          <a:p>
+            <a:r>
+              <a:rPr lang="en-US" dirty="0"/>
+              <a:t>So the frequency of the 13-inch string is 659.26 cycles per second.</a:t>
+            </a:r>
+            <a:endParaRPr lang="en-IN" b="1" dirty="0">
+              <a:solidFill>
+                <a:schemeClr val="tx1"/>
+              </a:solidFill>
+            </a:endParaRPr>
+          </a:p>
+        </p:txBody>
+      </p:sp>
+      <p:sp>
+        <p:nvSpPr>
+          <p:cNvPr id="6" name="Rectangle 5">
+            <a:extLst>
+              <a:ext uri="{FF2B5EF4-FFF2-40B4-BE49-F238E27FC236}">
+                <a16:creationId xmlns:a16="http://schemas.microsoft.com/office/drawing/2014/main" id="{33341DDE-51A7-BB4A-A5D0-B99BDB557C68}"/>
+              </a:ext>
+            </a:extLst>
+          </p:cNvPr>
+          <p:cNvSpPr/>
+          <p:nvPr/>
+        </p:nvSpPr>
+        <p:spPr>
+          <a:xfrm>
+            <a:off x="452746" y="749488"/>
+            <a:ext cx="1480557" cy="295175"/>
+          </a:xfrm>
+          <a:prstGeom prst="rect">
+            <a:avLst/>
+          </a:prstGeom>
+          <a:solidFill>
+            <a:srgbClr val="1A4F8D"/>
+          </a:solidFill>
+          <a:ln>
+            <a:noFill/>
+          </a:ln>
+        </p:spPr>
+        <p:style>
+          <a:lnRef idx="2">
+            <a:schemeClr val="accent1">
+              <a:shade val="50000"/>
+            </a:schemeClr>
+          </a:lnRef>
+          <a:fillRef idx="1">
+            <a:schemeClr val="accent1"/>
+          </a:fillRef>
+          <a:effectRef idx="0">
+            <a:schemeClr val="accent1"/>
+          </a:effectRef>
+          <a:fontRef idx="minor">
+            <a:schemeClr val="lt1"/>
+          </a:fontRef>
+        </p:style>
+        <p:txBody>
+          <a:bodyPr wrap="square" tIns="0" bIns="18000" rtlCol="0" anchor="ctr">
+            <a:spAutoFit/>
+          </a:bodyPr>
+          <a:lstStyle/>
+          <a:p>
+            <a:r>
+              <a:rPr lang="en-IN" sz="1800" b="1" cap="all" dirty="0">
+                <a:solidFill>
+                  <a:schemeClr val="bg1"/>
+                </a:solidFill>
+              </a:rPr>
+              <a:t>Example 3</a:t>
+            </a:r>
+            <a:endParaRPr lang="en-US" sz="1800" cap="all" dirty="0"/>
+          </a:p>
+        </p:txBody>
+      </p:sp>
+      <p:sp>
+        <p:nvSpPr>
+          <p:cNvPr id="8" name="TextBox 7">
+            <a:extLst>
+              <a:ext uri="{FF2B5EF4-FFF2-40B4-BE49-F238E27FC236}">
+                <a16:creationId xmlns:a16="http://schemas.microsoft.com/office/drawing/2014/main" id="{E2AF600D-6F8E-AF4F-9F8A-7A6BE3BFBF7F}"/>
+              </a:ext>
+            </a:extLst>
+          </p:cNvPr>
+          <p:cNvSpPr txBox="1"/>
+          <p:nvPr/>
+        </p:nvSpPr>
+        <p:spPr>
+          <a:xfrm>
+            <a:off x="355758" y="351588"/>
+            <a:ext cx="8341433" cy="369332"/>
+          </a:xfrm>
+          <a:prstGeom prst="rect">
+            <a:avLst/>
+          </a:prstGeom>
+          <a:noFill/>
+        </p:spPr>
+        <p:txBody>
+          <a:bodyPr wrap="square" rIns="36000" rtlCol="0">
+            <a:spAutoFit/>
+          </a:bodyPr>
+          <a:lstStyle/>
+          <a:p>
+            <a:r>
+              <a:rPr lang="en-IN" sz="1800" b="1" dirty="0">
+                <a:solidFill>
+                  <a:srgbClr val="137F97"/>
+                </a:solidFill>
+              </a:rPr>
+              <a:t>APPLICATION</a:t>
+            </a:r>
+            <a:endParaRPr lang="en-IN" sz="1800" dirty="0">
+              <a:solidFill>
+                <a:srgbClr val="137F97"/>
+              </a:solidFill>
+            </a:endParaRPr>
+          </a:p>
+        </p:txBody>
+      </p:sp>
+      <p:pic>
+        <p:nvPicPr>
+          <p:cNvPr id="7" name="Picture 6">
+            <a:extLst>
+              <a:ext uri="{FF2B5EF4-FFF2-40B4-BE49-F238E27FC236}">
+                <a16:creationId xmlns:a16="http://schemas.microsoft.com/office/drawing/2014/main" id="{98FF4F23-30DB-3176-1DAE-3721A1E367CF}"/>
+              </a:ext>
+            </a:extLst>
+          </p:cNvPr>
+          <p:cNvPicPr>
+            <a:picLocks noChangeAspect="1"/>
+          </p:cNvPicPr>
+          <p:nvPr/>
+        </p:nvPicPr>
+        <p:blipFill>
+          <a:blip r:embed="rId3"/>
+          <a:stretch>
+            <a:fillRect/>
+          </a:stretch>
+        </p:blipFill>
+        <p:spPr>
+          <a:xfrm>
+            <a:off x="999733" y="2087587"/>
+            <a:ext cx="3666850" cy="1521941"/>
+          </a:xfrm>
+          <a:prstGeom prst="rect">
+            <a:avLst/>
+          </a:prstGeom>
+        </p:spPr>
+      </p:pic>
+      <p:pic>
+        <p:nvPicPr>
+          <p:cNvPr id="10" name="Picture 9">
+            <a:extLst>
+              <a:ext uri="{FF2B5EF4-FFF2-40B4-BE49-F238E27FC236}">
+                <a16:creationId xmlns:a16="http://schemas.microsoft.com/office/drawing/2014/main" id="{9AE2C2B9-606B-9255-9BBF-A285867D70CB}"/>
+              </a:ext>
+            </a:extLst>
+          </p:cNvPr>
+          <p:cNvPicPr>
+            <a:picLocks noChangeAspect="1"/>
+          </p:cNvPicPr>
+          <p:nvPr/>
+        </p:nvPicPr>
+        <p:blipFill>
+          <a:blip r:embed="rId4"/>
+          <a:stretch>
+            <a:fillRect/>
+          </a:stretch>
+        </p:blipFill>
+        <p:spPr>
+          <a:xfrm>
+            <a:off x="1541322" y="4059583"/>
+            <a:ext cx="1379209" cy="1786900"/>
+          </a:xfrm>
+          <a:prstGeom prst="rect">
+            <a:avLst/>
+          </a:prstGeom>
+        </p:spPr>
+      </p:pic>
+      <p:sp>
+        <p:nvSpPr>
+          <p:cNvPr id="11" name="Rounded Rectangle 10">
+            <a:extLst>
+              <a:ext uri="{FF2B5EF4-FFF2-40B4-BE49-F238E27FC236}">
+                <a16:creationId xmlns:a16="http://schemas.microsoft.com/office/drawing/2014/main" id="{7DBBE5F8-EB03-1640-9E31-56DC3F7CB5E2}"/>
+              </a:ext>
+            </a:extLst>
+          </p:cNvPr>
+          <p:cNvSpPr/>
+          <p:nvPr/>
+        </p:nvSpPr>
+        <p:spPr>
+          <a:xfrm>
+            <a:off x="4849541" y="2360098"/>
+            <a:ext cx="3203080" cy="998025"/>
+          </a:xfrm>
+          <a:prstGeom prst="roundRect">
+            <a:avLst/>
+          </a:prstGeom>
+          <a:noFill/>
+          <a:ln w="12700">
+            <a:solidFill>
+              <a:schemeClr val="tx1">
+                <a:lumMod val="50000"/>
+                <a:lumOff val="50000"/>
+              </a:schemeClr>
+            </a:solidFill>
+          </a:ln>
+        </p:spPr>
+        <p:style>
+          <a:lnRef idx="2">
+            <a:schemeClr val="accent1">
+              <a:shade val="50000"/>
+            </a:schemeClr>
+          </a:lnRef>
+          <a:fillRef idx="1">
+            <a:schemeClr val="accent1"/>
+          </a:fillRef>
+          <a:effectRef idx="0">
+            <a:schemeClr val="accent1"/>
+          </a:effectRef>
+          <a:fontRef idx="minor">
+            <a:schemeClr val="lt1"/>
+          </a:fontRef>
+        </p:style>
+        <p:txBody>
+          <a:bodyPr rtlCol="0" anchor="ctr"/>
+          <a:lstStyle/>
+          <a:p>
+            <a:pPr>
+              <a:spcAft>
+                <a:spcPts val="300"/>
+              </a:spcAft>
+            </a:pPr>
+            <a:r>
+              <a:rPr lang="en-US" sz="1200" b="1" dirty="0">
+                <a:solidFill>
+                  <a:srgbClr val="C02B43"/>
+                </a:solidFill>
+              </a:rPr>
+              <a:t>MAKE SENSE AND PERSEVERE</a:t>
+            </a:r>
+            <a:endParaRPr lang="en-IN" sz="1200" b="1" dirty="0">
+              <a:solidFill>
+                <a:srgbClr val="C02B43"/>
+              </a:solidFill>
+            </a:endParaRPr>
+          </a:p>
+          <a:p>
+            <a:r>
+              <a:rPr lang="en-US" sz="1200" dirty="0">
+                <a:solidFill>
+                  <a:schemeClr val="tx1"/>
+                </a:solidFill>
+              </a:rPr>
+              <a:t>In stringed instruments, higher frequencies</a:t>
+            </a:r>
+            <a:br>
+              <a:rPr lang="en-US" sz="1200" dirty="0">
+                <a:solidFill>
+                  <a:schemeClr val="tx1"/>
+                </a:solidFill>
+              </a:rPr>
+            </a:br>
+            <a:r>
+              <a:rPr lang="en-US" sz="1200" dirty="0">
+                <a:solidFill>
+                  <a:schemeClr val="tx1"/>
+                </a:solidFill>
+              </a:rPr>
+              <a:t>result in higher pitched sounds. How does</a:t>
+            </a:r>
+            <a:br>
+              <a:rPr lang="en-US" sz="1200" dirty="0">
+                <a:solidFill>
+                  <a:schemeClr val="tx1"/>
+                </a:solidFill>
+              </a:rPr>
+            </a:br>
+            <a:r>
+              <a:rPr lang="en-US" sz="1200" dirty="0">
+                <a:solidFill>
+                  <a:schemeClr val="tx1"/>
+                </a:solidFill>
+              </a:rPr>
+              <a:t>varying string length affect pitch?</a:t>
+            </a:r>
+            <a:endParaRPr lang="en-IN" sz="1200" dirty="0">
+              <a:solidFill>
+                <a:schemeClr val="tx1"/>
+              </a:solidFill>
+              <a:latin typeface="Arial" panose="020B0604020202020204" pitchFamily="34" charset="0"/>
+              <a:cs typeface="Arial" panose="020B0604020202020204" pitchFamily="34" charset="0"/>
+            </a:endParaRPr>
+          </a:p>
+        </p:txBody>
+      </p:sp>
+      <p:sp>
+        <p:nvSpPr>
+          <p:cNvPr id="3" name="TextBox 2">
+            <a:extLst>
+              <a:ext uri="{FF2B5EF4-FFF2-40B4-BE49-F238E27FC236}">
+                <a16:creationId xmlns:a16="http://schemas.microsoft.com/office/drawing/2014/main" id="{6CD1D25C-E8C2-A99D-0F3D-BE069B346573}"/>
+              </a:ext>
+            </a:extLst>
+          </p:cNvPr>
+          <p:cNvSpPr txBox="1"/>
+          <p:nvPr/>
+        </p:nvSpPr>
+        <p:spPr>
+          <a:xfrm>
+            <a:off x="355758" y="1122573"/>
+            <a:ext cx="8321209" cy="584775"/>
+          </a:xfrm>
+          <a:prstGeom prst="rect">
+            <a:avLst/>
+          </a:prstGeom>
+          <a:noFill/>
+        </p:spPr>
+        <p:txBody>
+          <a:bodyPr wrap="square" rIns="36000" rtlCol="0">
+            <a:spAutoFit/>
+          </a:bodyPr>
+          <a:lstStyle/>
+          <a:p>
+            <a:r>
+              <a:rPr lang="en-US" sz="1600" b="1" dirty="0"/>
+              <a:t>The frequency of a 26-inch E-string is 329.63 cycles per second. What is the frequency when the string length is 13 inches?</a:t>
+            </a:r>
+            <a:endParaRPr lang="en-IN" sz="1600" b="1" dirty="0">
+              <a:solidFill>
+                <a:schemeClr val="tx1"/>
+              </a:solidFill>
+            </a:endParaRPr>
+          </a:p>
+        </p:txBody>
+      </p:sp>
+    </p:spTree>
+    <p:extLst>
+      <p:ext uri="{BB962C8B-B14F-4D97-AF65-F5344CB8AC3E}">
+        <p14:creationId xmlns:p14="http://schemas.microsoft.com/office/powerpoint/2010/main" val="3299242804"/>
       </p:ext>
     </p:extLst>
   </p:cSld>

</xml_diff>